<commit_message>
chore : example and document sanitization.
</commit_message>
<xml_diff>
--- a/report.pptx
+++ b/report.pptx
@@ -218,7 +218,7 @@
           <a:p>
             <a:fld id="{3C2B2464-EB56-4DC8-B218-81F43DA44C68}" type="datetimeFigureOut">
               <a:rPr lang="zh-CN" altLang="en-US" smtClean="0"/>
-              <a:t>2016/3/12</a:t>
+              <a:t>2023/3/29</a:t>
             </a:fld>
             <a:endParaRPr lang="zh-CN" altLang="en-US"/>
           </a:p>
@@ -282,38 +282,37 @@
           <a:p>
             <a:pPr lvl="0"/>
             <a:r>
-              <a:rPr lang="zh-CN" altLang="en-US" smtClean="0"/>
+              <a:rPr lang="zh-CN" altLang="en-US"/>
               <a:t>单击此处编辑母版文本样式</a:t>
             </a:r>
           </a:p>
           <a:p>
             <a:pPr lvl="1"/>
             <a:r>
-              <a:rPr lang="zh-CN" altLang="en-US" smtClean="0"/>
+              <a:rPr lang="zh-CN" altLang="en-US"/>
               <a:t>第二级</a:t>
             </a:r>
           </a:p>
           <a:p>
             <a:pPr lvl="2"/>
             <a:r>
-              <a:rPr lang="zh-CN" altLang="en-US" smtClean="0"/>
+              <a:rPr lang="zh-CN" altLang="en-US"/>
               <a:t>第三级</a:t>
             </a:r>
           </a:p>
           <a:p>
             <a:pPr lvl="3"/>
             <a:r>
-              <a:rPr lang="zh-CN" altLang="en-US" smtClean="0"/>
+              <a:rPr lang="zh-CN" altLang="en-US"/>
               <a:t>第四级</a:t>
             </a:r>
           </a:p>
           <a:p>
             <a:pPr lvl="4"/>
             <a:r>
-              <a:rPr lang="zh-CN" altLang="en-US" smtClean="0"/>
+              <a:rPr lang="zh-CN" altLang="en-US"/>
               <a:t>第五级</a:t>
             </a:r>
-            <a:endParaRPr lang="zh-CN" altLang="en-US"/>
           </a:p>
         </p:txBody>
       </p:sp>
@@ -615,34 +614,33 @@
           <a:lstStyle/>
           <a:p>
             <a:r>
-              <a:rPr lang="zh-CN" altLang="en-US" dirty="0" smtClean="0"/>
+              <a:rPr lang="zh-CN" altLang="en-US" dirty="0"/>
               <a:t>多边形的</a:t>
             </a:r>
             <a:r>
-              <a:rPr lang="en-US" altLang="zh-CN" dirty="0" err="1" smtClean="0"/>
+              <a:rPr lang="en-US" altLang="zh-CN" dirty="0" err="1"/>
               <a:t>bool</a:t>
             </a:r>
             <a:r>
-              <a:rPr lang="zh-CN" altLang="en-US" dirty="0" smtClean="0"/>
+              <a:rPr lang="zh-CN" altLang="en-US" dirty="0"/>
               <a:t>运算通过</a:t>
             </a:r>
             <a:r>
-              <a:rPr lang="en-US" altLang="zh-CN" dirty="0" err="1" smtClean="0"/>
+              <a:rPr lang="en-US" altLang="zh-CN" dirty="0" err="1"/>
               <a:t>BspTree</a:t>
             </a:r>
             <a:r>
-              <a:rPr lang="zh-CN" altLang="en-US" dirty="0" smtClean="0"/>
+              <a:rPr lang="zh-CN" altLang="en-US" dirty="0"/>
               <a:t>的</a:t>
             </a:r>
             <a:r>
-              <a:rPr lang="en-US" altLang="zh-CN" dirty="0" smtClean="0"/>
+              <a:rPr lang="en-US" altLang="zh-CN" dirty="0"/>
               <a:t>merge</a:t>
             </a:r>
             <a:r>
-              <a:rPr lang="zh-CN" altLang="en-US" dirty="0" smtClean="0"/>
+              <a:rPr lang="zh-CN" altLang="en-US" dirty="0"/>
               <a:t>来完成</a:t>
             </a:r>
-            <a:endParaRPr lang="zh-CN" altLang="en-US" dirty="0"/>
           </a:p>
         </p:txBody>
       </p:sp>
@@ -811,10 +809,9 @@
           <a:lstStyle/>
           <a:p>
             <a:r>
-              <a:rPr lang="zh-CN" altLang="en-US" dirty="0" smtClean="0"/>
+              <a:rPr lang="zh-CN" altLang="en-US" dirty="0"/>
               <a:t>论文中提到了这篇文章。</a:t>
             </a:r>
-            <a:endParaRPr lang="zh-CN" altLang="en-US" dirty="0"/>
           </a:p>
         </p:txBody>
       </p:sp>
@@ -901,7 +898,7 @@
           </a:lstStyle>
           <a:p>
             <a:r>
-              <a:rPr lang="zh-CN" altLang="en-US" smtClean="0"/>
+              <a:rPr lang="zh-CN" altLang="en-US"/>
               <a:t>单击此处编辑母版标题样式</a:t>
             </a:r>
             <a:endParaRPr lang="en-US" dirty="0"/>
@@ -1022,7 +1019,7 @@
           </a:lstStyle>
           <a:p>
             <a:r>
-              <a:rPr lang="zh-CN" altLang="en-US" smtClean="0"/>
+              <a:rPr lang="zh-CN" altLang="en-US"/>
               <a:t>单击此处编辑母版副标题样式</a:t>
             </a:r>
             <a:endParaRPr lang="en-US" dirty="0"/>
@@ -1046,7 +1043,7 @@
           <a:p>
             <a:fld id="{ED95B161-E6B9-4331-BE3F-5F47C10A512B}" type="datetimeFigureOut">
               <a:rPr lang="zh-CN" altLang="en-US" smtClean="0"/>
-              <a:t>2016/3/12</a:t>
+              <a:t>2023/3/29</a:t>
             </a:fld>
             <a:endParaRPr lang="zh-CN" altLang="en-US"/>
           </a:p>
@@ -1135,7 +1132,7 @@
           <a:lstStyle/>
           <a:p>
             <a:r>
-              <a:rPr lang="zh-CN" altLang="en-US" smtClean="0"/>
+              <a:rPr lang="zh-CN" altLang="en-US"/>
               <a:t>单击此处编辑母版标题样式</a:t>
             </a:r>
             <a:endParaRPr lang="en-US" dirty="0"/>
@@ -1159,35 +1156,35 @@
           <a:p>
             <a:pPr lvl="0"/>
             <a:r>
-              <a:rPr lang="zh-CN" altLang="en-US" smtClean="0"/>
+              <a:rPr lang="zh-CN" altLang="en-US"/>
               <a:t>单击此处编辑母版文本样式</a:t>
             </a:r>
           </a:p>
           <a:p>
             <a:pPr lvl="1"/>
             <a:r>
-              <a:rPr lang="zh-CN" altLang="en-US" smtClean="0"/>
+              <a:rPr lang="zh-CN" altLang="en-US"/>
               <a:t>第二级</a:t>
             </a:r>
           </a:p>
           <a:p>
             <a:pPr lvl="2"/>
             <a:r>
-              <a:rPr lang="zh-CN" altLang="en-US" smtClean="0"/>
+              <a:rPr lang="zh-CN" altLang="en-US"/>
               <a:t>第三级</a:t>
             </a:r>
           </a:p>
           <a:p>
             <a:pPr lvl="3"/>
             <a:r>
-              <a:rPr lang="zh-CN" altLang="en-US" smtClean="0"/>
+              <a:rPr lang="zh-CN" altLang="en-US"/>
               <a:t>第四级</a:t>
             </a:r>
           </a:p>
           <a:p>
             <a:pPr lvl="4"/>
             <a:r>
-              <a:rPr lang="zh-CN" altLang="en-US" smtClean="0"/>
+              <a:rPr lang="zh-CN" altLang="en-US"/>
               <a:t>第五级</a:t>
             </a:r>
             <a:endParaRPr lang="en-US"/>
@@ -1211,7 +1208,7 @@
           <a:p>
             <a:fld id="{ED95B161-E6B9-4331-BE3F-5F47C10A512B}" type="datetimeFigureOut">
               <a:rPr lang="zh-CN" altLang="en-US" smtClean="0"/>
-              <a:t>2016/3/12</a:t>
+              <a:t>2023/3/29</a:t>
             </a:fld>
             <a:endParaRPr lang="zh-CN" altLang="en-US"/>
           </a:p>
@@ -1305,7 +1302,7 @@
           <a:lstStyle/>
           <a:p>
             <a:r>
-              <a:rPr lang="zh-CN" altLang="en-US" smtClean="0"/>
+              <a:rPr lang="zh-CN" altLang="en-US"/>
               <a:t>单击此处编辑母版标题样式</a:t>
             </a:r>
             <a:endParaRPr lang="en-US" dirty="0"/>
@@ -1334,35 +1331,35 @@
           <a:p>
             <a:pPr lvl="0"/>
             <a:r>
-              <a:rPr lang="zh-CN" altLang="en-US" smtClean="0"/>
+              <a:rPr lang="zh-CN" altLang="en-US"/>
               <a:t>单击此处编辑母版文本样式</a:t>
             </a:r>
           </a:p>
           <a:p>
             <a:pPr lvl="1"/>
             <a:r>
-              <a:rPr lang="zh-CN" altLang="en-US" smtClean="0"/>
+              <a:rPr lang="zh-CN" altLang="en-US"/>
               <a:t>第二级</a:t>
             </a:r>
           </a:p>
           <a:p>
             <a:pPr lvl="2"/>
             <a:r>
-              <a:rPr lang="zh-CN" altLang="en-US" smtClean="0"/>
+              <a:rPr lang="zh-CN" altLang="en-US"/>
               <a:t>第三级</a:t>
             </a:r>
           </a:p>
           <a:p>
             <a:pPr lvl="3"/>
             <a:r>
-              <a:rPr lang="zh-CN" altLang="en-US" smtClean="0"/>
+              <a:rPr lang="zh-CN" altLang="en-US"/>
               <a:t>第四级</a:t>
             </a:r>
           </a:p>
           <a:p>
             <a:pPr lvl="4"/>
             <a:r>
-              <a:rPr lang="zh-CN" altLang="en-US" smtClean="0"/>
+              <a:rPr lang="zh-CN" altLang="en-US"/>
               <a:t>第五级</a:t>
             </a:r>
             <a:endParaRPr lang="en-US"/>
@@ -1386,7 +1383,7 @@
           <a:p>
             <a:fld id="{ED95B161-E6B9-4331-BE3F-5F47C10A512B}" type="datetimeFigureOut">
               <a:rPr lang="zh-CN" altLang="en-US" smtClean="0"/>
-              <a:t>2016/3/12</a:t>
+              <a:t>2023/3/29</a:t>
             </a:fld>
             <a:endParaRPr lang="zh-CN" altLang="en-US"/>
           </a:p>
@@ -1475,7 +1472,7 @@
           <a:lstStyle/>
           <a:p>
             <a:r>
-              <a:rPr lang="zh-CN" altLang="en-US" smtClean="0"/>
+              <a:rPr lang="zh-CN" altLang="en-US"/>
               <a:t>单击此处编辑母版标题样式</a:t>
             </a:r>
             <a:endParaRPr lang="en-US" dirty="0"/>
@@ -1517,38 +1514,38 @@
           <a:p>
             <a:pPr lvl="0"/>
             <a:r>
-              <a:rPr lang="zh-CN" altLang="en-US" smtClean="0"/>
+              <a:rPr lang="zh-CN" altLang="en-US"/>
               <a:t>单击此处编辑母版文本样式</a:t>
             </a:r>
           </a:p>
           <a:p>
             <a:pPr lvl="1"/>
             <a:r>
-              <a:rPr lang="zh-CN" altLang="en-US" smtClean="0"/>
+              <a:rPr lang="zh-CN" altLang="en-US"/>
               <a:t>第二级</a:t>
             </a:r>
           </a:p>
           <a:p>
             <a:pPr lvl="2"/>
             <a:r>
-              <a:rPr lang="zh-CN" altLang="en-US" smtClean="0"/>
+              <a:rPr lang="zh-CN" altLang="en-US"/>
               <a:t>第三级</a:t>
             </a:r>
           </a:p>
           <a:p>
             <a:pPr lvl="3"/>
             <a:r>
-              <a:rPr lang="zh-CN" altLang="en-US" smtClean="0"/>
+              <a:rPr lang="zh-CN" altLang="en-US"/>
               <a:t>第四级</a:t>
             </a:r>
           </a:p>
           <a:p>
             <a:pPr lvl="4"/>
             <a:r>
-              <a:rPr lang="zh-CN" altLang="en-US" smtClean="0"/>
+              <a:rPr lang="zh-CN" altLang="en-US"/>
               <a:t>第五级</a:t>
             </a:r>
-            <a:endParaRPr lang="en-US" dirty="0" smtClean="0"/>
+            <a:endParaRPr lang="en-US" dirty="0"/>
           </a:p>
         </p:txBody>
       </p:sp>
@@ -1569,7 +1566,7 @@
           <a:p>
             <a:fld id="{ED95B161-E6B9-4331-BE3F-5F47C10A512B}" type="datetimeFigureOut">
               <a:rPr lang="zh-CN" altLang="en-US" smtClean="0"/>
-              <a:t>2016/3/12</a:t>
+              <a:t>2023/3/29</a:t>
             </a:fld>
             <a:endParaRPr lang="zh-CN" altLang="en-US"/>
           </a:p>
@@ -1688,7 +1685,7 @@
           </a:lstStyle>
           <a:p>
             <a:r>
-              <a:rPr lang="zh-CN" altLang="en-US" smtClean="0"/>
+              <a:rPr lang="zh-CN" altLang="en-US"/>
               <a:t>单击此处编辑母版标题样式</a:t>
             </a:r>
             <a:endParaRPr lang="en-US" dirty="0"/>
@@ -1808,7 +1805,7 @@
           <a:p>
             <a:pPr lvl="0"/>
             <a:r>
-              <a:rPr lang="zh-CN" altLang="en-US" smtClean="0"/>
+              <a:rPr lang="zh-CN" altLang="en-US"/>
               <a:t>单击此处编辑母版文本样式</a:t>
             </a:r>
           </a:p>
@@ -1831,7 +1828,7 @@
           <a:p>
             <a:fld id="{ED95B161-E6B9-4331-BE3F-5F47C10A512B}" type="datetimeFigureOut">
               <a:rPr lang="zh-CN" altLang="en-US" smtClean="0"/>
-              <a:t>2016/3/12</a:t>
+              <a:t>2023/3/29</a:t>
             </a:fld>
             <a:endParaRPr lang="zh-CN" altLang="en-US"/>
           </a:p>
@@ -2070,7 +2067,7 @@
           <a:lstStyle/>
           <a:p>
             <a:r>
-              <a:rPr lang="zh-CN" altLang="en-US" smtClean="0"/>
+              <a:rPr lang="zh-CN" altLang="en-US"/>
               <a:t>单击此处编辑母版标题样式</a:t>
             </a:r>
             <a:endParaRPr lang="en-US"/>
@@ -2127,38 +2124,38 @@
           <a:p>
             <a:pPr lvl="0"/>
             <a:r>
-              <a:rPr lang="zh-CN" altLang="en-US" smtClean="0"/>
+              <a:rPr lang="zh-CN" altLang="en-US"/>
               <a:t>单击此处编辑母版文本样式</a:t>
             </a:r>
           </a:p>
           <a:p>
             <a:pPr lvl="1"/>
             <a:r>
-              <a:rPr lang="zh-CN" altLang="en-US" smtClean="0"/>
+              <a:rPr lang="zh-CN" altLang="en-US"/>
               <a:t>第二级</a:t>
             </a:r>
           </a:p>
           <a:p>
             <a:pPr lvl="2"/>
             <a:r>
-              <a:rPr lang="zh-CN" altLang="en-US" smtClean="0"/>
+              <a:rPr lang="zh-CN" altLang="en-US"/>
               <a:t>第三级</a:t>
             </a:r>
           </a:p>
           <a:p>
             <a:pPr lvl="3"/>
             <a:r>
-              <a:rPr lang="zh-CN" altLang="en-US" smtClean="0"/>
+              <a:rPr lang="zh-CN" altLang="en-US"/>
               <a:t>第四级</a:t>
             </a:r>
           </a:p>
           <a:p>
             <a:pPr lvl="4"/>
             <a:r>
-              <a:rPr lang="zh-CN" altLang="en-US" smtClean="0"/>
+              <a:rPr lang="zh-CN" altLang="en-US"/>
               <a:t>第五级</a:t>
             </a:r>
-            <a:endParaRPr lang="en-US" dirty="0" smtClean="0"/>
+            <a:endParaRPr lang="en-US" dirty="0"/>
           </a:p>
         </p:txBody>
       </p:sp>
@@ -2179,7 +2176,7 @@
           <a:p>
             <a:fld id="{ED95B161-E6B9-4331-BE3F-5F47C10A512B}" type="datetimeFigureOut">
               <a:rPr lang="zh-CN" altLang="en-US" smtClean="0"/>
-              <a:t>2016/3/12</a:t>
+              <a:t>2023/3/29</a:t>
             </a:fld>
             <a:endParaRPr lang="zh-CN" altLang="en-US"/>
           </a:p>
@@ -2249,35 +2246,35 @@
           <a:p>
             <a:pPr lvl="0"/>
             <a:r>
-              <a:rPr lang="zh-CN" altLang="en-US" smtClean="0"/>
+              <a:rPr lang="zh-CN" altLang="en-US"/>
               <a:t>单击此处编辑母版文本样式</a:t>
             </a:r>
           </a:p>
           <a:p>
             <a:pPr lvl="1"/>
             <a:r>
-              <a:rPr lang="zh-CN" altLang="en-US" smtClean="0"/>
+              <a:rPr lang="zh-CN" altLang="en-US"/>
               <a:t>第二级</a:t>
             </a:r>
           </a:p>
           <a:p>
             <a:pPr lvl="2"/>
             <a:r>
-              <a:rPr lang="zh-CN" altLang="en-US" smtClean="0"/>
+              <a:rPr lang="zh-CN" altLang="en-US"/>
               <a:t>第三级</a:t>
             </a:r>
           </a:p>
           <a:p>
             <a:pPr lvl="3"/>
             <a:r>
-              <a:rPr lang="zh-CN" altLang="en-US" smtClean="0"/>
+              <a:rPr lang="zh-CN" altLang="en-US"/>
               <a:t>第四级</a:t>
             </a:r>
           </a:p>
           <a:p>
             <a:pPr lvl="4"/>
             <a:r>
-              <a:rPr lang="zh-CN" altLang="en-US" smtClean="0"/>
+              <a:rPr lang="zh-CN" altLang="en-US"/>
               <a:t>第五级</a:t>
             </a:r>
             <a:endParaRPr lang="en-US"/>
@@ -2329,7 +2326,7 @@
           </a:lstStyle>
           <a:p>
             <a:r>
-              <a:rPr lang="zh-CN" altLang="en-US" smtClean="0"/>
+              <a:rPr lang="zh-CN" altLang="en-US"/>
               <a:t>单击此处编辑母版标题样式</a:t>
             </a:r>
             <a:endParaRPr lang="en-US"/>
@@ -2397,7 +2394,7 @@
           <a:p>
             <a:pPr lvl="0"/>
             <a:r>
-              <a:rPr lang="zh-CN" altLang="en-US" smtClean="0"/>
+              <a:rPr lang="zh-CN" altLang="en-US"/>
               <a:t>单击此处编辑母版文本样式</a:t>
             </a:r>
           </a:p>
@@ -2464,7 +2461,7 @@
           <a:p>
             <a:pPr lvl="0"/>
             <a:r>
-              <a:rPr lang="zh-CN" altLang="en-US" smtClean="0"/>
+              <a:rPr lang="zh-CN" altLang="en-US"/>
               <a:t>单击此处编辑母版文本样式</a:t>
             </a:r>
           </a:p>
@@ -2487,7 +2484,7 @@
           <a:p>
             <a:fld id="{ED95B161-E6B9-4331-BE3F-5F47C10A512B}" type="datetimeFigureOut">
               <a:rPr lang="zh-CN" altLang="en-US" smtClean="0"/>
-              <a:t>2016/3/12</a:t>
+              <a:t>2023/3/29</a:t>
             </a:fld>
             <a:endParaRPr lang="zh-CN" altLang="en-US"/>
           </a:p>
@@ -2557,35 +2554,35 @@
           <a:p>
             <a:pPr lvl="0"/>
             <a:r>
-              <a:rPr lang="zh-CN" altLang="en-US" smtClean="0"/>
+              <a:rPr lang="zh-CN" altLang="en-US"/>
               <a:t>单击此处编辑母版文本样式</a:t>
             </a:r>
           </a:p>
           <a:p>
             <a:pPr lvl="1"/>
             <a:r>
-              <a:rPr lang="zh-CN" altLang="en-US" smtClean="0"/>
+              <a:rPr lang="zh-CN" altLang="en-US"/>
               <a:t>第二级</a:t>
             </a:r>
           </a:p>
           <a:p>
             <a:pPr lvl="2"/>
             <a:r>
-              <a:rPr lang="zh-CN" altLang="en-US" smtClean="0"/>
+              <a:rPr lang="zh-CN" altLang="en-US"/>
               <a:t>第三级</a:t>
             </a:r>
           </a:p>
           <a:p>
             <a:pPr lvl="3"/>
             <a:r>
-              <a:rPr lang="zh-CN" altLang="en-US" smtClean="0"/>
+              <a:rPr lang="zh-CN" altLang="en-US"/>
               <a:t>第四级</a:t>
             </a:r>
           </a:p>
           <a:p>
             <a:pPr lvl="4"/>
             <a:r>
-              <a:rPr lang="zh-CN" altLang="en-US" smtClean="0"/>
+              <a:rPr lang="zh-CN" altLang="en-US"/>
               <a:t>第五级</a:t>
             </a:r>
             <a:endParaRPr lang="en-US" dirty="0"/>
@@ -2614,35 +2611,35 @@
           <a:p>
             <a:pPr lvl="0"/>
             <a:r>
-              <a:rPr lang="zh-CN" altLang="en-US" smtClean="0"/>
+              <a:rPr lang="zh-CN" altLang="en-US"/>
               <a:t>单击此处编辑母版文本样式</a:t>
             </a:r>
           </a:p>
           <a:p>
             <a:pPr lvl="1"/>
             <a:r>
-              <a:rPr lang="zh-CN" altLang="en-US" smtClean="0"/>
+              <a:rPr lang="zh-CN" altLang="en-US"/>
               <a:t>第二级</a:t>
             </a:r>
           </a:p>
           <a:p>
             <a:pPr lvl="2"/>
             <a:r>
-              <a:rPr lang="zh-CN" altLang="en-US" smtClean="0"/>
+              <a:rPr lang="zh-CN" altLang="en-US"/>
               <a:t>第三级</a:t>
             </a:r>
           </a:p>
           <a:p>
             <a:pPr lvl="3"/>
             <a:r>
-              <a:rPr lang="zh-CN" altLang="en-US" smtClean="0"/>
+              <a:rPr lang="zh-CN" altLang="en-US"/>
               <a:t>第四级</a:t>
             </a:r>
           </a:p>
           <a:p>
             <a:pPr lvl="4"/>
             <a:r>
-              <a:rPr lang="zh-CN" altLang="en-US" smtClean="0"/>
+              <a:rPr lang="zh-CN" altLang="en-US"/>
               <a:t>第五级</a:t>
             </a:r>
             <a:endParaRPr lang="en-US" dirty="0"/>
@@ -2690,7 +2687,7 @@
           <a:lstStyle/>
           <a:p>
             <a:r>
-              <a:rPr lang="zh-CN" altLang="en-US" smtClean="0"/>
+              <a:rPr lang="zh-CN" altLang="en-US"/>
               <a:t>单击此处编辑母版标题样式</a:t>
             </a:r>
             <a:endParaRPr lang="en-US" dirty="0"/>
@@ -2714,7 +2711,7 @@
           <a:p>
             <a:fld id="{ED95B161-E6B9-4331-BE3F-5F47C10A512B}" type="datetimeFigureOut">
               <a:rPr lang="zh-CN" altLang="en-US" smtClean="0"/>
-              <a:t>2016/3/12</a:t>
+              <a:t>2023/3/29</a:t>
             </a:fld>
             <a:endParaRPr lang="zh-CN" altLang="en-US"/>
           </a:p>
@@ -2804,7 +2801,7 @@
           <a:p>
             <a:fld id="{ED95B161-E6B9-4331-BE3F-5F47C10A512B}" type="datetimeFigureOut">
               <a:rPr lang="zh-CN" altLang="en-US" smtClean="0"/>
-              <a:t>2016/3/12</a:t>
+              <a:t>2023/3/29</a:t>
             </a:fld>
             <a:endParaRPr lang="zh-CN" altLang="en-US"/>
           </a:p>
@@ -2913,7 +2910,7 @@
           </a:lstStyle>
           <a:p>
             <a:r>
-              <a:rPr lang="zh-CN" altLang="en-US" smtClean="0"/>
+              <a:rPr lang="zh-CN" altLang="en-US"/>
               <a:t>单击此处编辑母版标题样式</a:t>
             </a:r>
             <a:endParaRPr lang="en-US" dirty="0"/>
@@ -2970,35 +2967,35 @@
           <a:p>
             <a:pPr lvl="0"/>
             <a:r>
-              <a:rPr lang="zh-CN" altLang="en-US" smtClean="0"/>
+              <a:rPr lang="zh-CN" altLang="en-US"/>
               <a:t>单击此处编辑母版文本样式</a:t>
             </a:r>
           </a:p>
           <a:p>
             <a:pPr lvl="1"/>
             <a:r>
-              <a:rPr lang="zh-CN" altLang="en-US" smtClean="0"/>
+              <a:rPr lang="zh-CN" altLang="en-US"/>
               <a:t>第二级</a:t>
             </a:r>
           </a:p>
           <a:p>
             <a:pPr lvl="2"/>
             <a:r>
-              <a:rPr lang="zh-CN" altLang="en-US" smtClean="0"/>
+              <a:rPr lang="zh-CN" altLang="en-US"/>
               <a:t>第三级</a:t>
             </a:r>
           </a:p>
           <a:p>
             <a:pPr lvl="3"/>
             <a:r>
-              <a:rPr lang="zh-CN" altLang="en-US" smtClean="0"/>
+              <a:rPr lang="zh-CN" altLang="en-US"/>
               <a:t>第四级</a:t>
             </a:r>
           </a:p>
           <a:p>
             <a:pPr lvl="4"/>
             <a:r>
-              <a:rPr lang="zh-CN" altLang="en-US" smtClean="0"/>
+              <a:rPr lang="zh-CN" altLang="en-US"/>
               <a:t>第五级</a:t>
             </a:r>
             <a:endParaRPr lang="en-US" dirty="0"/>
@@ -3069,7 +3066,7 @@
           <a:p>
             <a:pPr lvl="0"/>
             <a:r>
-              <a:rPr lang="zh-CN" altLang="en-US" smtClean="0"/>
+              <a:rPr lang="zh-CN" altLang="en-US"/>
               <a:t>单击此处编辑母版文本样式</a:t>
             </a:r>
           </a:p>
@@ -3092,7 +3089,7 @@
           <a:p>
             <a:fld id="{ED95B161-E6B9-4331-BE3F-5F47C10A512B}" type="datetimeFigureOut">
               <a:rPr lang="zh-CN" altLang="en-US" smtClean="0"/>
-              <a:t>2016/3/12</a:t>
+              <a:t>2023/3/29</a:t>
             </a:fld>
             <a:endParaRPr lang="zh-CN" altLang="en-US"/>
           </a:p>
@@ -3193,7 +3190,7 @@
           </a:lstStyle>
           <a:p>
             <a:r>
-              <a:rPr lang="zh-CN" altLang="en-US" smtClean="0"/>
+              <a:rPr lang="zh-CN" altLang="en-US"/>
               <a:t>单击此处编辑母版标题样式</a:t>
             </a:r>
             <a:endParaRPr lang="en-US" dirty="0"/>
@@ -3270,7 +3267,7 @@
           </a:lstStyle>
           <a:p>
             <a:r>
-              <a:rPr lang="zh-CN" altLang="en-US" smtClean="0"/>
+              <a:rPr lang="zh-CN" altLang="en-US"/>
               <a:t>单击图标添加图片</a:t>
             </a:r>
             <a:endParaRPr lang="en-US" dirty="0"/>
@@ -3338,7 +3335,7 @@
           <a:p>
             <a:pPr lvl="0"/>
             <a:r>
-              <a:rPr lang="zh-CN" altLang="en-US" smtClean="0"/>
+              <a:rPr lang="zh-CN" altLang="en-US"/>
               <a:t>单击此处编辑母版文本样式</a:t>
             </a:r>
           </a:p>
@@ -3361,7 +3358,7 @@
           <a:p>
             <a:fld id="{ED95B161-E6B9-4331-BE3F-5F47C10A512B}" type="datetimeFigureOut">
               <a:rPr lang="zh-CN" altLang="en-US" smtClean="0"/>
-              <a:t>2016/3/12</a:t>
+              <a:t>2023/3/29</a:t>
             </a:fld>
             <a:endParaRPr lang="zh-CN" altLang="en-US"/>
           </a:p>
@@ -3465,7 +3462,7 @@
           <a:lstStyle/>
           <a:p>
             <a:r>
-              <a:rPr lang="zh-CN" altLang="en-US" smtClean="0"/>
+              <a:rPr lang="zh-CN" altLang="en-US"/>
               <a:t>单击此处编辑母版标题样式</a:t>
             </a:r>
             <a:endParaRPr lang="en-US" dirty="0"/>
@@ -3499,38 +3496,38 @@
           <a:p>
             <a:pPr lvl="0"/>
             <a:r>
-              <a:rPr lang="zh-CN" altLang="en-US" smtClean="0"/>
+              <a:rPr lang="zh-CN" altLang="en-US"/>
               <a:t>单击此处编辑母版文本样式</a:t>
             </a:r>
           </a:p>
           <a:p>
             <a:pPr lvl="1"/>
             <a:r>
-              <a:rPr lang="zh-CN" altLang="en-US" smtClean="0"/>
+              <a:rPr lang="zh-CN" altLang="en-US"/>
               <a:t>第二级</a:t>
             </a:r>
           </a:p>
           <a:p>
             <a:pPr lvl="2"/>
             <a:r>
-              <a:rPr lang="zh-CN" altLang="en-US" smtClean="0"/>
+              <a:rPr lang="zh-CN" altLang="en-US"/>
               <a:t>第三级</a:t>
             </a:r>
           </a:p>
           <a:p>
             <a:pPr lvl="3"/>
             <a:r>
-              <a:rPr lang="zh-CN" altLang="en-US" smtClean="0"/>
+              <a:rPr lang="zh-CN" altLang="en-US"/>
               <a:t>第四级</a:t>
             </a:r>
           </a:p>
           <a:p>
             <a:pPr lvl="4"/>
             <a:r>
-              <a:rPr lang="zh-CN" altLang="en-US" smtClean="0"/>
+              <a:rPr lang="zh-CN" altLang="en-US"/>
               <a:t>第五级</a:t>
             </a:r>
-            <a:endParaRPr lang="en-US" dirty="0" smtClean="0"/>
+            <a:endParaRPr lang="en-US" dirty="0"/>
           </a:p>
         </p:txBody>
       </p:sp>
@@ -3571,7 +3568,7 @@
           <a:p>
             <a:fld id="{ED95B161-E6B9-4331-BE3F-5F47C10A512B}" type="datetimeFigureOut">
               <a:rPr lang="zh-CN" altLang="en-US" smtClean="0"/>
-              <a:t>2016/3/12</a:t>
+              <a:t>2023/3/29</a:t>
             </a:fld>
             <a:endParaRPr lang="zh-CN" altLang="en-US"/>
           </a:p>
@@ -4111,33 +4108,7 @@
           <a:p>
             <a:r>
               <a:rPr lang="en-US" altLang="zh-CN" sz="3600" dirty="0"/>
-              <a:t/>
-            </a:r>
-            <a:br>
-              <a:rPr lang="en-US" altLang="zh-CN" sz="3600" dirty="0"/>
-            </a:br>
-            <a:r>
-              <a:rPr lang="en-US" altLang="zh-CN" sz="3600" dirty="0"/>
-              <a:t/>
-            </a:r>
-            <a:br>
-              <a:rPr lang="en-US" altLang="zh-CN" sz="3600" dirty="0"/>
-            </a:br>
-            <a:r>
-              <a:rPr lang="zh-CN" altLang="en-US" sz="4400" dirty="0" smtClean="0"/>
-              <a:t>基于</a:t>
-            </a:r>
-            <a:r>
-              <a:rPr lang="en-US" altLang="zh-CN" sz="4400" dirty="0"/>
-              <a:t>binary space partitioning </a:t>
-            </a:r>
-            <a:r>
-              <a:rPr lang="en-US" altLang="zh-CN" sz="4400" dirty="0" smtClean="0"/>
-              <a:t>tree</a:t>
-            </a:r>
-            <a:r>
-              <a:rPr lang="zh-CN" altLang="en-US" sz="4400" dirty="0" smtClean="0"/>
-              <a:t>的一般多边形布尔运算</a:t>
+              <a:t>General polygon Boolean operations based on binary space partitioning tree</a:t>
             </a:r>
             <a:endParaRPr lang="zh-CN" altLang="en-US" sz="4400" dirty="0"/>
           </a:p>
@@ -4166,26 +4137,37 @@
           <a:lstStyle/>
           <a:p>
             <a:r>
-              <a:rPr lang="en-US" altLang="zh-CN" b="1" dirty="0" smtClean="0">
+              <a:rPr lang="en-US" altLang="zh-CN" b="1" dirty="0" err="1">
                 <a:solidFill>
                   <a:schemeClr val="tx1"/>
                 </a:solidFill>
               </a:rPr>
-              <a:t>Sun </a:t>
-            </a:r>
-            <a:r>
-              <a:rPr lang="en-US" altLang="zh-CN" b="1" dirty="0" err="1" smtClean="0">
+              <a:t>Gyu</a:t>
+            </a:r>
+            <a:r>
+              <a:rPr lang="en-US" altLang="zh-CN" b="1" dirty="0">
                 <a:solidFill>
                   <a:schemeClr val="tx1"/>
                 </a:solidFill>
               </a:rPr>
-              <a:t>Siyuan</a:t>
-            </a:r>
-            <a:endParaRPr lang="en-US" altLang="zh-CN" b="1" dirty="0" smtClean="0">
-              <a:solidFill>
-                <a:schemeClr val="tx1"/>
-              </a:solidFill>
-            </a:endParaRPr>
+              <a:t> </a:t>
+            </a:r>
+            <a:r>
+              <a:rPr lang="en-US" altLang="zh-CN" b="1" dirty="0" err="1">
+                <a:solidFill>
+                  <a:schemeClr val="tx1"/>
+                </a:solidFill>
+              </a:rPr>
+              <a:t>Jin</a:t>
+            </a:r>
+            <a:r>
+              <a:rPr lang="en-US" altLang="zh-CN" b="1" dirty="0">
+                <a:solidFill>
+                  <a:schemeClr val="tx1"/>
+                </a:solidFill>
+              </a:rPr>
+              <a:t> Choi</a:t>
+            </a:r>
           </a:p>
           <a:p>
             <a:endParaRPr lang="en-US" altLang="zh-CN" dirty="0">
@@ -4196,12 +4178,12 @@
           </a:p>
           <a:p>
             <a:r>
-              <a:rPr lang="en-US" altLang="zh-CN" b="1" dirty="0" smtClean="0">
+              <a:rPr lang="en-US" altLang="zh-CN" b="1" dirty="0">
                 <a:solidFill>
                   <a:schemeClr val="tx1"/>
                 </a:solidFill>
               </a:rPr>
-              <a:t>2014.12.26</a:t>
+              <a:t>2023.04.05</a:t>
             </a:r>
             <a:endParaRPr lang="zh-CN" altLang="en-US" b="1" dirty="0">
               <a:solidFill>
@@ -4221,13 +4203,6 @@
   <p:clrMapOvr>
     <a:masterClrMapping/>
   </p:clrMapOvr>
-  <p:timing>
-    <p:tnLst>
-      <p:par>
-        <p:cTn id="1" dur="indefinite" restart="never" nodeType="tmRoot"/>
-      </p:par>
-    </p:tnLst>
-  </p:timing>
 </p:sld>
 </file>
 
@@ -4269,7 +4244,7 @@
           <a:lstStyle/>
           <a:p>
             <a:r>
-              <a:rPr lang="en-US" altLang="zh-CN" dirty="0" smtClean="0"/>
+              <a:rPr lang="en-US" altLang="zh-CN" dirty="0"/>
               <a:t>Others </a:t>
             </a:r>
             <a:endParaRPr lang="zh-CN" altLang="en-US" dirty="0"/>
@@ -4306,20 +4281,10 @@
                 <a:latin typeface="Times New Roman" panose="02020603050405020304" pitchFamily="18" charset="0"/>
                 <a:cs typeface="Times New Roman" panose="02020603050405020304" pitchFamily="18" charset="0"/>
               </a:rPr>
-              <a:t>合法性</a:t>
-            </a:r>
-            <a:r>
-              <a:rPr lang="zh-CN" altLang="en-US" b="1" dirty="0" smtClean="0">
-                <a:solidFill>
-                  <a:schemeClr val="tx1"/>
-                </a:solidFill>
-                <a:latin typeface="Times New Roman" panose="02020603050405020304" pitchFamily="18" charset="0"/>
-                <a:cs typeface="Times New Roman" panose="02020603050405020304" pitchFamily="18" charset="0"/>
-              </a:rPr>
-              <a:t>检查（利用了</a:t>
-            </a:r>
-            <a:r>
-              <a:rPr lang="en-US" altLang="zh-CN" b="1" dirty="0" err="1" smtClean="0">
+              <a:t>合法性检查（利用了</a:t>
+            </a:r>
+            <a:r>
+              <a:rPr lang="en-US" altLang="zh-CN" b="1" dirty="0" err="1">
                 <a:solidFill>
                   <a:schemeClr val="tx1"/>
                 </a:solidFill>
@@ -4329,7 +4294,7 @@
               <a:t>BspTree</a:t>
             </a:r>
             <a:r>
-              <a:rPr lang="zh-CN" altLang="en-US" b="1" dirty="0" smtClean="0">
+              <a:rPr lang="zh-CN" altLang="en-US" b="1" dirty="0">
                 <a:solidFill>
                   <a:schemeClr val="tx1"/>
                 </a:solidFill>
@@ -4338,7 +4303,7 @@
               </a:rPr>
               <a:t>的区域划分）</a:t>
             </a:r>
-            <a:endParaRPr lang="en-US" altLang="zh-CN" b="1" dirty="0" smtClean="0">
+            <a:endParaRPr lang="en-US" altLang="zh-CN" b="1" dirty="0">
               <a:solidFill>
                 <a:schemeClr val="tx1"/>
               </a:solidFill>
@@ -4351,7 +4316,7 @@
               <a:buNone/>
             </a:pPr>
             <a:r>
-              <a:rPr lang="zh-CN" altLang="en-US" sz="1900" b="1" dirty="0" smtClean="0">
+              <a:rPr lang="zh-CN" altLang="en-US" sz="1900" b="1" dirty="0">
                 <a:solidFill>
                   <a:schemeClr val="tx1"/>
                 </a:solidFill>
@@ -4360,7 +4325,7 @@
               </a:rPr>
               <a:t>环：</a:t>
             </a:r>
-            <a:endParaRPr lang="en-US" altLang="zh-CN" sz="1900" b="1" dirty="0" smtClean="0">
+            <a:endParaRPr lang="en-US" altLang="zh-CN" sz="1900" b="1" dirty="0">
               <a:solidFill>
                 <a:schemeClr val="tx1"/>
               </a:solidFill>
@@ -4402,18 +4367,42 @@
                 <a:latin typeface="Times New Roman" panose="02020603050405020304" pitchFamily="18" charset="0"/>
                 <a:cs typeface="Times New Roman" panose="02020603050405020304" pitchFamily="18" charset="0"/>
               </a:rPr>
-              <a:t>环内部</a:t>
-            </a:r>
-            <a:r>
-              <a:rPr lang="zh-CN" altLang="en-US" sz="1900" dirty="0" smtClean="0">
+              <a:t>环内部除相邻边顶点重合外其他任何交点都非法。</a:t>
+            </a:r>
+            <a:endParaRPr lang="en-US" altLang="zh-CN" sz="1900" b="1" dirty="0">
+              <a:solidFill>
+                <a:schemeClr val="tx1"/>
+              </a:solidFill>
+              <a:latin typeface="Times New Roman" panose="02020603050405020304" pitchFamily="18" charset="0"/>
+              <a:cs typeface="Times New Roman" panose="02020603050405020304" pitchFamily="18" charset="0"/>
+            </a:endParaRPr>
+          </a:p>
+          <a:p>
+            <a:pPr marL="0" indent="0">
+              <a:buNone/>
+            </a:pPr>
+            <a:r>
+              <a:rPr lang="zh-CN" altLang="en-US" sz="1900" b="1" dirty="0">
                 <a:solidFill>
                   <a:schemeClr val="tx1"/>
                 </a:solidFill>
                 <a:latin typeface="Times New Roman" panose="02020603050405020304" pitchFamily="18" charset="0"/>
                 <a:cs typeface="Times New Roman" panose="02020603050405020304" pitchFamily="18" charset="0"/>
               </a:rPr>
-              <a:t>除相邻边顶点重合</a:t>
-            </a:r>
+              <a:t>区域：</a:t>
+            </a:r>
+            <a:endParaRPr lang="en-US" altLang="zh-CN" sz="1900" dirty="0">
+              <a:solidFill>
+                <a:schemeClr val="tx1"/>
+              </a:solidFill>
+              <a:latin typeface="Times New Roman" panose="02020603050405020304" pitchFamily="18" charset="0"/>
+              <a:cs typeface="Times New Roman" panose="02020603050405020304" pitchFamily="18" charset="0"/>
+            </a:endParaRPr>
+          </a:p>
+          <a:p>
+            <a:pPr marL="0" indent="0">
+              <a:buNone/>
+            </a:pPr>
             <a:r>
               <a:rPr lang="zh-CN" altLang="en-US" sz="1900" dirty="0">
                 <a:solidFill>
@@ -4422,39 +4411,7 @@
                 <a:latin typeface="Times New Roman" panose="02020603050405020304" pitchFamily="18" charset="0"/>
                 <a:cs typeface="Times New Roman" panose="02020603050405020304" pitchFamily="18" charset="0"/>
               </a:rPr>
-              <a:t>外其他任何交点都非法</a:t>
-            </a:r>
-            <a:r>
-              <a:rPr lang="zh-CN" altLang="en-US" sz="1900" dirty="0" smtClean="0">
-                <a:solidFill>
-                  <a:schemeClr val="tx1"/>
-                </a:solidFill>
-                <a:latin typeface="Times New Roman" panose="02020603050405020304" pitchFamily="18" charset="0"/>
-                <a:cs typeface="Times New Roman" panose="02020603050405020304" pitchFamily="18" charset="0"/>
-              </a:rPr>
-              <a:t>。</a:t>
-            </a:r>
-            <a:endParaRPr lang="en-US" altLang="zh-CN" sz="1900" b="1" dirty="0" smtClean="0">
-              <a:solidFill>
-                <a:schemeClr val="tx1"/>
-              </a:solidFill>
-              <a:latin typeface="Times New Roman" panose="02020603050405020304" pitchFamily="18" charset="0"/>
-              <a:cs typeface="Times New Roman" panose="02020603050405020304" pitchFamily="18" charset="0"/>
-            </a:endParaRPr>
-          </a:p>
-          <a:p>
-            <a:pPr marL="0" indent="0">
-              <a:buNone/>
-            </a:pPr>
-            <a:r>
-              <a:rPr lang="zh-CN" altLang="en-US" sz="1900" b="1" dirty="0" smtClean="0">
-                <a:solidFill>
-                  <a:schemeClr val="tx1"/>
-                </a:solidFill>
-                <a:latin typeface="Times New Roman" panose="02020603050405020304" pitchFamily="18" charset="0"/>
-                <a:cs typeface="Times New Roman" panose="02020603050405020304" pitchFamily="18" charset="0"/>
-              </a:rPr>
-              <a:t>区域：</a:t>
+              <a:t>环都合法；</a:t>
             </a:r>
             <a:endParaRPr lang="en-US" altLang="zh-CN" sz="1900" dirty="0">
               <a:solidFill>
@@ -4469,16 +4426,6 @@
               <a:buNone/>
             </a:pPr>
             <a:r>
-              <a:rPr lang="zh-CN" altLang="en-US" sz="1900" dirty="0" smtClean="0">
-                <a:solidFill>
-                  <a:schemeClr val="tx1"/>
-                </a:solidFill>
-                <a:latin typeface="Times New Roman" panose="02020603050405020304" pitchFamily="18" charset="0"/>
-                <a:cs typeface="Times New Roman" panose="02020603050405020304" pitchFamily="18" charset="0"/>
-              </a:rPr>
-              <a:t>环</a:t>
-            </a:r>
-            <a:r>
               <a:rPr lang="zh-CN" altLang="en-US" sz="1900" dirty="0">
                 <a:solidFill>
                   <a:schemeClr val="tx1"/>
@@ -4486,19 +4433,9 @@
                 <a:latin typeface="Times New Roman" panose="02020603050405020304" pitchFamily="18" charset="0"/>
                 <a:cs typeface="Times New Roman" panose="02020603050405020304" pitchFamily="18" charset="0"/>
               </a:rPr>
-              <a:t>都合法</a:t>
-            </a:r>
-            <a:r>
-              <a:rPr lang="zh-CN" altLang="en-US" sz="1900" dirty="0" smtClean="0">
-                <a:solidFill>
-                  <a:schemeClr val="tx1"/>
-                </a:solidFill>
-                <a:latin typeface="Times New Roman" panose="02020603050405020304" pitchFamily="18" charset="0"/>
-                <a:cs typeface="Times New Roman" panose="02020603050405020304" pitchFamily="18" charset="0"/>
-              </a:rPr>
-              <a:t>；</a:t>
-            </a:r>
-            <a:endParaRPr lang="en-US" altLang="zh-CN" sz="1900" dirty="0" smtClean="0">
+              <a:t>内环都在外环内部；</a:t>
+            </a:r>
+            <a:endParaRPr lang="en-US" altLang="zh-CN" sz="1900" dirty="0">
               <a:solidFill>
                 <a:schemeClr val="tx1"/>
               </a:solidFill>
@@ -4510,16 +4447,6 @@
             <a:pPr marL="0" indent="0">
               <a:buNone/>
             </a:pPr>
-            <a:r>
-              <a:rPr lang="zh-CN" altLang="en-US" sz="1900" dirty="0" smtClean="0">
-                <a:solidFill>
-                  <a:schemeClr val="tx1"/>
-                </a:solidFill>
-                <a:latin typeface="Times New Roman" panose="02020603050405020304" pitchFamily="18" charset="0"/>
-                <a:cs typeface="Times New Roman" panose="02020603050405020304" pitchFamily="18" charset="0"/>
-              </a:rPr>
-              <a:t>内环</a:t>
-            </a:r>
             <a:r>
               <a:rPr lang="zh-CN" altLang="en-US" sz="1900" dirty="0">
                 <a:solidFill>
@@ -4528,49 +4455,7 @@
                 <a:latin typeface="Times New Roman" panose="02020603050405020304" pitchFamily="18" charset="0"/>
                 <a:cs typeface="Times New Roman" panose="02020603050405020304" pitchFamily="18" charset="0"/>
               </a:rPr>
-              <a:t>都在外环内部</a:t>
-            </a:r>
-            <a:r>
-              <a:rPr lang="zh-CN" altLang="en-US" sz="1900" dirty="0" smtClean="0">
-                <a:solidFill>
-                  <a:schemeClr val="tx1"/>
-                </a:solidFill>
-                <a:latin typeface="Times New Roman" panose="02020603050405020304" pitchFamily="18" charset="0"/>
-                <a:cs typeface="Times New Roman" panose="02020603050405020304" pitchFamily="18" charset="0"/>
-              </a:rPr>
-              <a:t>；</a:t>
-            </a:r>
-            <a:endParaRPr lang="en-US" altLang="zh-CN" sz="1900" dirty="0" smtClean="0">
-              <a:solidFill>
-                <a:schemeClr val="tx1"/>
-              </a:solidFill>
-              <a:latin typeface="Times New Roman" panose="02020603050405020304" pitchFamily="18" charset="0"/>
-              <a:cs typeface="Times New Roman" panose="02020603050405020304" pitchFamily="18" charset="0"/>
-            </a:endParaRPr>
-          </a:p>
-          <a:p>
-            <a:pPr marL="0" indent="0">
-              <a:buNone/>
-            </a:pPr>
-            <a:r>
-              <a:rPr lang="zh-CN" altLang="en-US" sz="1900" dirty="0" smtClean="0">
-                <a:solidFill>
-                  <a:schemeClr val="tx1"/>
-                </a:solidFill>
-                <a:latin typeface="Times New Roman" panose="02020603050405020304" pitchFamily="18" charset="0"/>
-                <a:cs typeface="Times New Roman" panose="02020603050405020304" pitchFamily="18" charset="0"/>
-              </a:rPr>
-              <a:t>内环</a:t>
-            </a:r>
-            <a:r>
-              <a:rPr lang="zh-CN" altLang="en-US" sz="1900" dirty="0">
-                <a:solidFill>
-                  <a:schemeClr val="tx1"/>
-                </a:solidFill>
-                <a:latin typeface="Times New Roman" panose="02020603050405020304" pitchFamily="18" charset="0"/>
-                <a:cs typeface="Times New Roman" panose="02020603050405020304" pitchFamily="18" charset="0"/>
-              </a:rPr>
-              <a:t>之间区域重合面积应等于</a:t>
+              <a:t>内环之间区域重合面积应等于</a:t>
             </a:r>
             <a:r>
               <a:rPr lang="en-US" altLang="zh-CN" sz="1900" dirty="0">
@@ -4583,7 +4468,7 @@
               <a:t>0</a:t>
             </a:r>
             <a:r>
-              <a:rPr lang="zh-CN" altLang="en-US" sz="1900" dirty="0" smtClean="0">
+              <a:rPr lang="zh-CN" altLang="en-US" sz="1900" dirty="0">
                 <a:solidFill>
                   <a:schemeClr val="tx1"/>
                 </a:solidFill>
@@ -4592,7 +4477,7 @@
               </a:rPr>
               <a:t>；</a:t>
             </a:r>
-            <a:endParaRPr lang="en-US" altLang="zh-CN" sz="1900" dirty="0" smtClean="0">
+            <a:endParaRPr lang="en-US" altLang="zh-CN" sz="1900" dirty="0">
               <a:solidFill>
                 <a:schemeClr val="tx1"/>
               </a:solidFill>
@@ -4604,16 +4489,6 @@
             <a:pPr marL="0" indent="0">
               <a:buNone/>
             </a:pPr>
-            <a:r>
-              <a:rPr lang="zh-CN" altLang="en-US" sz="1900" dirty="0" smtClean="0">
-                <a:solidFill>
-                  <a:schemeClr val="tx1"/>
-                </a:solidFill>
-                <a:latin typeface="Times New Roman" panose="02020603050405020304" pitchFamily="18" charset="0"/>
-                <a:cs typeface="Times New Roman" panose="02020603050405020304" pitchFamily="18" charset="0"/>
-              </a:rPr>
-              <a:t>环</a:t>
-            </a:r>
             <a:r>
               <a:rPr lang="zh-CN" altLang="en-US" sz="1900" dirty="0">
                 <a:solidFill>
@@ -4622,19 +4497,9 @@
                 <a:latin typeface="Times New Roman" panose="02020603050405020304" pitchFamily="18" charset="0"/>
                 <a:cs typeface="Times New Roman" panose="02020603050405020304" pitchFamily="18" charset="0"/>
               </a:rPr>
-              <a:t>之间除顶点重合外，出现任何交点都非法</a:t>
-            </a:r>
-            <a:r>
-              <a:rPr lang="zh-CN" altLang="en-US" sz="1900" dirty="0" smtClean="0">
-                <a:solidFill>
-                  <a:schemeClr val="tx1"/>
-                </a:solidFill>
-                <a:latin typeface="Times New Roman" panose="02020603050405020304" pitchFamily="18" charset="0"/>
-                <a:cs typeface="Times New Roman" panose="02020603050405020304" pitchFamily="18" charset="0"/>
-              </a:rPr>
-              <a:t>。</a:t>
-            </a:r>
-            <a:endParaRPr lang="en-US" altLang="zh-CN" sz="1900" b="1" dirty="0" smtClean="0">
+              <a:t>环之间除顶点重合外，出现任何交点都非法。</a:t>
+            </a:r>
+            <a:endParaRPr lang="en-US" altLang="zh-CN" sz="1900" b="1" dirty="0">
               <a:solidFill>
                 <a:schemeClr val="tx1"/>
               </a:solidFill>
@@ -4647,7 +4512,7 @@
               <a:buNone/>
             </a:pPr>
             <a:r>
-              <a:rPr lang="zh-CN" altLang="en-US" sz="1900" b="1" dirty="0" smtClean="0">
+              <a:rPr lang="zh-CN" altLang="en-US" sz="1900" b="1" dirty="0">
                 <a:solidFill>
                   <a:schemeClr val="tx1"/>
                 </a:solidFill>
@@ -4656,7 +4521,7 @@
               </a:rPr>
               <a:t>多边形：</a:t>
             </a:r>
-            <a:endParaRPr lang="en-US" altLang="zh-CN" sz="1900" b="1" dirty="0" smtClean="0">
+            <a:endParaRPr lang="en-US" altLang="zh-CN" sz="1900" b="1" dirty="0">
               <a:solidFill>
                 <a:schemeClr val="tx1"/>
               </a:solidFill>
@@ -4751,7 +4616,7 @@
             </a:endParaRPr>
           </a:p>
           <a:p>
-            <a:endParaRPr lang="en-US" altLang="zh-CN" b="1" dirty="0" smtClean="0">
+            <a:endParaRPr lang="en-US" altLang="zh-CN" b="1" dirty="0">
               <a:solidFill>
                 <a:schemeClr val="tx1"/>
               </a:solidFill>
@@ -4768,19 +4633,9 @@
                 <a:latin typeface="Times New Roman" panose="02020603050405020304" pitchFamily="18" charset="0"/>
                 <a:cs typeface="Times New Roman" panose="02020603050405020304" pitchFamily="18" charset="0"/>
               </a:rPr>
-              <a:t>内存</a:t>
-            </a:r>
-            <a:r>
-              <a:rPr lang="zh-CN" altLang="en-US" b="1" dirty="0" smtClean="0">
-                <a:solidFill>
-                  <a:schemeClr val="tx1"/>
-                </a:solidFill>
-                <a:latin typeface="Times New Roman" panose="02020603050405020304" pitchFamily="18" charset="0"/>
-                <a:cs typeface="Times New Roman" panose="02020603050405020304" pitchFamily="18" charset="0"/>
-              </a:rPr>
-              <a:t>管理：容器记录，统一释放</a:t>
-            </a:r>
-            <a:endParaRPr lang="en-US" altLang="zh-CN" b="1" dirty="0" smtClean="0">
+              <a:t>内存管理：容器记录，统一释放</a:t>
+            </a:r>
+            <a:endParaRPr lang="en-US" altLang="zh-CN" b="1" dirty="0">
               <a:solidFill>
                 <a:schemeClr val="tx1"/>
               </a:solidFill>
@@ -4801,15 +4656,6 @@
             </a:endParaRPr>
           </a:p>
           <a:p>
-            <a:endParaRPr lang="en-US" altLang="zh-CN" dirty="0" smtClean="0">
-              <a:solidFill>
-                <a:schemeClr val="tx1"/>
-              </a:solidFill>
-              <a:latin typeface="Times New Roman" panose="02020603050405020304" pitchFamily="18" charset="0"/>
-              <a:cs typeface="Times New Roman" panose="02020603050405020304" pitchFamily="18" charset="0"/>
-            </a:endParaRPr>
-          </a:p>
-          <a:p>
             <a:endParaRPr lang="en-US" altLang="zh-CN" dirty="0">
               <a:solidFill>
                 <a:schemeClr val="tx1"/>
@@ -4819,7 +4665,16 @@
             </a:endParaRPr>
           </a:p>
           <a:p>
-            <a:endParaRPr lang="en-US" altLang="zh-CN" dirty="0" smtClean="0">
+            <a:endParaRPr lang="en-US" altLang="zh-CN" dirty="0">
+              <a:solidFill>
+                <a:schemeClr val="tx1"/>
+              </a:solidFill>
+              <a:latin typeface="Times New Roman" panose="02020603050405020304" pitchFamily="18" charset="0"/>
+              <a:cs typeface="Times New Roman" panose="02020603050405020304" pitchFamily="18" charset="0"/>
+            </a:endParaRPr>
+          </a:p>
+          <a:p>
+            <a:endParaRPr lang="en-US" altLang="zh-CN" dirty="0">
               <a:solidFill>
                 <a:schemeClr val="tx1"/>
               </a:solidFill>
@@ -4848,13 +4703,6 @@
   <p:clrMapOvr>
     <a:masterClrMapping/>
   </p:clrMapOvr>
-  <p:timing>
-    <p:tnLst>
-      <p:par>
-        <p:cTn id="1" dur="indefinite" restart="never" nodeType="tmRoot"/>
-      </p:par>
-    </p:tnLst>
-  </p:timing>
 </p:sld>
 </file>
 
@@ -4896,7 +4744,7 @@
           <a:lstStyle/>
           <a:p>
             <a:r>
-              <a:rPr lang="en-US" altLang="zh-CN" sz="11500" dirty="0" smtClean="0"/>
+              <a:rPr lang="en-US" altLang="zh-CN" sz="11500" dirty="0"/>
               <a:t>E&amp;Q</a:t>
             </a:r>
             <a:endParaRPr lang="zh-CN" altLang="en-US" sz="11500" dirty="0"/>
@@ -4913,13 +4761,6 @@
   <p:clrMapOvr>
     <a:masterClrMapping/>
   </p:clrMapOvr>
-  <p:timing>
-    <p:tnLst>
-      <p:par>
-        <p:cTn id="1" dur="indefinite" restart="never" nodeType="tmRoot"/>
-      </p:par>
-    </p:tnLst>
-  </p:timing>
 </p:sld>
 </file>
 
@@ -4961,8 +4802,8 @@
           <a:lstStyle/>
           <a:p>
             <a:r>
-              <a:rPr lang="zh-CN" altLang="en-US" dirty="0" smtClean="0"/>
-              <a:t>参考文献</a:t>
+              <a:rPr lang="en-US" altLang="zh-CN" dirty="0"/>
+              <a:t>references</a:t>
             </a:r>
             <a:endParaRPr lang="zh-CN" altLang="en-US" dirty="0"/>
           </a:p>
@@ -5038,21 +4879,11 @@
                 <a:latin typeface="Times New Roman" panose="02020603050405020304" pitchFamily="18" charset="0"/>
                 <a:cs typeface="Times New Roman" panose="02020603050405020304" pitchFamily="18" charset="0"/>
               </a:rPr>
-              <a:t>[C]//Computer Graphics Forum. Blackwell Publishing Ltd, 2009, 28(5): 1269-1278</a:t>
-            </a:r>
-            <a:r>
-              <a:rPr lang="en-US" altLang="zh-CN" dirty="0" smtClean="0">
-                <a:solidFill>
-                  <a:schemeClr val="tx1"/>
-                </a:solidFill>
-                <a:latin typeface="Times New Roman" panose="02020603050405020304" pitchFamily="18" charset="0"/>
-                <a:cs typeface="Times New Roman" panose="02020603050405020304" pitchFamily="18" charset="0"/>
-              </a:rPr>
-              <a:t>.</a:t>
-            </a:r>
-          </a:p>
-          <a:p>
-            <a:endParaRPr lang="en-US" altLang="zh-CN" dirty="0" smtClean="0">
+              <a:t>[C]//Computer Graphics Forum. Blackwell Publishing Ltd, 2009, 28(5): 1269-1278.</a:t>
+            </a:r>
+          </a:p>
+          <a:p>
+            <a:endParaRPr lang="en-US" altLang="zh-CN" dirty="0">
               <a:solidFill>
                 <a:schemeClr val="tx1"/>
               </a:solidFill>
@@ -5109,17 +4940,7 @@
                 <a:latin typeface="Times New Roman" panose="02020603050405020304" pitchFamily="18" charset="0"/>
                 <a:cs typeface="Times New Roman" panose="02020603050405020304" pitchFamily="18" charset="0"/>
               </a:rPr>
-              <a:t> W. Merging BSP trees yields polyhedral set operations[C]//ACM SIGGRAPH Computer Graphics. ACM, 1990, 24(4): 115-124</a:t>
-            </a:r>
-            <a:r>
-              <a:rPr lang="en-US" altLang="zh-CN" b="1" dirty="0" smtClean="0">
-                <a:solidFill>
-                  <a:schemeClr val="tx1"/>
-                </a:solidFill>
-                <a:latin typeface="Times New Roman" panose="02020603050405020304" pitchFamily="18" charset="0"/>
-                <a:cs typeface="Times New Roman" panose="02020603050405020304" pitchFamily="18" charset="0"/>
-              </a:rPr>
-              <a:t>.</a:t>
+              <a:t> W. Merging BSP trees yields polyhedral set operations[C]//ACM SIGGRAPH Computer Graphics. ACM, 1990, 24(4): 115-124.</a:t>
             </a:r>
           </a:p>
           <a:p>
@@ -5161,21 +4982,11 @@
                 <a:latin typeface="Times New Roman" panose="02020603050405020304" pitchFamily="18" charset="0"/>
                 <a:cs typeface="Times New Roman" panose="02020603050405020304" pitchFamily="18" charset="0"/>
               </a:rPr>
-              <a:t> using binary space partitioning trees[C]//ACM SIGGRAPH computer graphics. ACM, 1987, 21(4): 153-162</a:t>
-            </a:r>
-            <a:r>
-              <a:rPr lang="en-US" altLang="zh-CN" dirty="0" smtClean="0">
-                <a:solidFill>
-                  <a:schemeClr val="tx1"/>
-                </a:solidFill>
-                <a:latin typeface="Times New Roman" panose="02020603050405020304" pitchFamily="18" charset="0"/>
-                <a:cs typeface="Times New Roman" panose="02020603050405020304" pitchFamily="18" charset="0"/>
-              </a:rPr>
-              <a:t>.</a:t>
-            </a:r>
-          </a:p>
-          <a:p>
-            <a:endParaRPr lang="en-US" altLang="zh-CN" dirty="0" smtClean="0">
+              <a:t> using binary space partitioning trees[C]//ACM SIGGRAPH computer graphics. ACM, 1987, 21(4): 153-162.</a:t>
+            </a:r>
+          </a:p>
+          <a:p>
+            <a:endParaRPr lang="en-US" altLang="zh-CN" dirty="0">
               <a:solidFill>
                 <a:schemeClr val="tx1"/>
               </a:solidFill>
@@ -5460,15 +5271,15 @@
           <a:lstStyle/>
           <a:p>
             <a:r>
-              <a:rPr lang="en-US" altLang="zh-CN" dirty="0" smtClean="0"/>
+              <a:rPr lang="en-US" altLang="zh-CN" dirty="0"/>
               <a:t>Intro: </a:t>
             </a:r>
             <a:r>
-              <a:rPr lang="en-US" altLang="zh-CN" dirty="0" err="1" smtClean="0"/>
+              <a:rPr lang="en-US" altLang="zh-CN" dirty="0" err="1"/>
               <a:t>BspTree</a:t>
             </a:r>
             <a:r>
-              <a:rPr lang="en-US" altLang="zh-CN" dirty="0" smtClean="0"/>
+              <a:rPr lang="en-US" altLang="zh-CN" dirty="0"/>
               <a:t> </a:t>
             </a:r>
             <a:endParaRPr lang="zh-CN" altLang="en-US" dirty="0"/>
@@ -6098,7 +5909,7 @@
                 <a:lstStyle/>
                 <a:p>
                   <a:r>
-                    <a:rPr lang="en-US" altLang="zh-CN" sz="1400" dirty="0" smtClean="0">
+                    <a:rPr lang="en-US" altLang="zh-CN" sz="1400" dirty="0">
                       <a:latin typeface="Times New Roman" panose="02020603050405020304" pitchFamily="18" charset="0"/>
                       <a:cs typeface="Times New Roman" panose="02020603050405020304" pitchFamily="18" charset="0"/>
                     </a:rPr>
@@ -6138,14 +5949,7 @@
                       <a:latin typeface="Times New Roman" panose="02020603050405020304" pitchFamily="18" charset="0"/>
                       <a:cs typeface="Times New Roman" panose="02020603050405020304" pitchFamily="18" charset="0"/>
                     </a:rPr>
-                    <a:t>h</a:t>
-                  </a:r>
-                  <a:r>
-                    <a:rPr lang="en-US" altLang="zh-CN" sz="1400" dirty="0" smtClean="0">
-                      <a:latin typeface="Times New Roman" panose="02020603050405020304" pitchFamily="18" charset="0"/>
-                      <a:cs typeface="Times New Roman" panose="02020603050405020304" pitchFamily="18" charset="0"/>
-                    </a:rPr>
-                    <a:t>+</a:t>
+                    <a:t>h+</a:t>
                   </a:r>
                   <a:endParaRPr lang="zh-CN" altLang="en-US" sz="1400" dirty="0">
                     <a:latin typeface="Times New Roman" panose="02020603050405020304" pitchFamily="18" charset="0"/>
@@ -6181,14 +5985,7 @@
                       <a:latin typeface="Times New Roman" panose="02020603050405020304" pitchFamily="18" charset="0"/>
                       <a:cs typeface="Times New Roman" panose="02020603050405020304" pitchFamily="18" charset="0"/>
                     </a:rPr>
-                    <a:t>h</a:t>
-                  </a:r>
-                  <a:r>
-                    <a:rPr lang="en-US" altLang="zh-CN" sz="1400" dirty="0" smtClean="0">
-                      <a:latin typeface="Times New Roman" panose="02020603050405020304" pitchFamily="18" charset="0"/>
-                      <a:cs typeface="Times New Roman" panose="02020603050405020304" pitchFamily="18" charset="0"/>
-                    </a:rPr>
-                    <a:t>-</a:t>
+                    <a:t>h-</a:t>
                   </a:r>
                   <a:endParaRPr lang="zh-CN" altLang="en-US" sz="1400" dirty="0">
                     <a:latin typeface="Times New Roman" panose="02020603050405020304" pitchFamily="18" charset="0"/>
@@ -6278,7 +6075,7 @@
         </p:nvGrpSpPr>
         <p:grpSpPr>
           <a:xfrm>
-            <a:off x="1641248" y="3807688"/>
+            <a:off x="159706" y="3991233"/>
             <a:ext cx="5924462" cy="2654940"/>
             <a:chOff x="1641248" y="3807688"/>
             <a:chExt cx="5924462" cy="2654940"/>
@@ -6408,10 +6205,10 @@
         </p:nvGrpSpPr>
         <p:grpSpPr>
           <a:xfrm>
-            <a:off x="695585" y="3983318"/>
-            <a:ext cx="7416824" cy="2499877"/>
+            <a:off x="6588224" y="4146296"/>
+            <a:ext cx="7416824" cy="2776876"/>
             <a:chOff x="971600" y="3379711"/>
-            <a:chExt cx="7416824" cy="2499877"/>
+            <a:chExt cx="7416824" cy="2776876"/>
           </a:xfrm>
         </p:grpSpPr>
         <p:pic>
@@ -6456,7 +6253,7 @@
           <p:spPr>
             <a:xfrm>
               <a:off x="971600" y="5233257"/>
-              <a:ext cx="7416824" cy="646331"/>
+              <a:ext cx="7416824" cy="923330"/>
             </a:xfrm>
             <a:prstGeom prst="rect">
               <a:avLst/>
@@ -6470,62 +6267,31 @@
             <a:p>
               <a:r>
                 <a:rPr lang="en-US" altLang="zh-CN" dirty="0"/>
-                <a:t>a.</a:t>
-              </a:r>
-              <a:r>
-                <a:rPr lang="zh-CN" altLang="zh-CN" dirty="0"/>
-                <a:t>目标简单多边形</a:t>
-              </a:r>
-              <a:r>
-                <a:rPr lang="en-US" altLang="zh-CN" dirty="0"/>
-                <a:t>(</a:t>
-              </a:r>
-              <a:r>
-                <a:rPr lang="zh-CN" altLang="zh-CN" dirty="0"/>
-                <a:t>红色边界</a:t>
-              </a:r>
-              <a:r>
-                <a:rPr lang="en-US" altLang="zh-CN" dirty="0"/>
-                <a:t>) </a:t>
-              </a:r>
-              <a:r>
-                <a:rPr lang="en-US" altLang="zh-CN" dirty="0" smtClean="0"/>
-                <a:t>   </a:t>
-              </a:r>
-              <a:r>
-                <a:rPr lang="en-US" altLang="zh-CN" dirty="0" err="1"/>
-                <a:t>b.a</a:t>
-              </a:r>
-              <a:r>
-                <a:rPr lang="zh-CN" altLang="zh-CN" dirty="0"/>
-                <a:t>中目标简单多边形区域的</a:t>
+                <a:t>a. Target simple polygon (red border) b. </a:t>
               </a:r>
               <a:r>
                 <a:rPr lang="en-US" altLang="zh-CN" dirty="0" err="1"/>
                 <a:t>BspTree</a:t>
               </a:r>
               <a:r>
-                <a:rPr lang="zh-CN" altLang="zh-CN" dirty="0"/>
-                <a:t>表示</a:t>
+                <a:rPr lang="en-US" altLang="zh-CN" dirty="0"/>
+                <a:t> representation of the target simple polygon area in a</a:t>
               </a:r>
             </a:p>
             <a:p>
               <a:r>
-                <a:rPr lang="en-US" altLang="zh-CN" dirty="0" smtClean="0"/>
-                <a:t>                             </a:t>
-              </a:r>
-              <a:r>
-                <a:rPr lang="zh-CN" altLang="zh-CN" dirty="0" smtClean="0"/>
-                <a:t>用</a:t>
+                <a:rPr lang="en-US" altLang="zh-CN" dirty="0"/>
+                <a:t>                              Use </a:t>
               </a:r>
               <a:r>
                 <a:rPr lang="en-US" altLang="zh-CN" dirty="0" err="1"/>
                 <a:t>BspTree</a:t>
               </a:r>
               <a:r>
-                <a:rPr lang="zh-CN" altLang="zh-CN" dirty="0"/>
-                <a:t>表示简单多边形区域</a:t>
+                <a:rPr lang="en-US" altLang="zh-CN" dirty="0"/>
+                <a:t> to express simple polygon area</a:t>
               </a:r>
+              <a:endParaRPr lang="zh-CN" altLang="zh-CN" dirty="0"/>
             </a:p>
           </p:txBody>
         </p:sp>
@@ -6539,7 +6305,7 @@
         <p:spPr>
           <a:xfrm>
             <a:off x="6084168" y="1530464"/>
-            <a:ext cx="2952328" cy="1938992"/>
+            <a:ext cx="2952328" cy="1631216"/>
           </a:xfrm>
           <a:prstGeom prst="rect">
             <a:avLst/>
@@ -6552,35 +6318,23 @@
           <a:lstStyle/>
           <a:p>
             <a:r>
-              <a:rPr lang="zh-CN" altLang="en-US" sz="2000" dirty="0" smtClean="0">
+              <a:rPr lang="en-US" altLang="zh-CN" sz="2000" dirty="0">
                 <a:solidFill>
                   <a:srgbClr val="FF0000"/>
                 </a:solidFill>
               </a:rPr>
-              <a:t>        每个节点表示一个区域。</a:t>
-            </a:r>
-            <a:endParaRPr lang="en-US" altLang="zh-CN" sz="2000" dirty="0" smtClean="0">
-              <a:solidFill>
-                <a:srgbClr val="FF0000"/>
-              </a:solidFill>
-            </a:endParaRPr>
-          </a:p>
-          <a:p>
-            <a:r>
-              <a:rPr lang="zh-CN" altLang="en-US" sz="2000" dirty="0" smtClean="0">
+              <a:t>Each node represents a region.</a:t>
+            </a:r>
+          </a:p>
+          <a:p>
+            <a:r>
+              <a:rPr lang="en-US" altLang="zh-CN" sz="2000" dirty="0">
                 <a:solidFill>
                   <a:srgbClr val="FF0000"/>
                 </a:solidFill>
               </a:rPr>
-              <a:t>        若节点不是叶子节点，则节点还包含一个划分。</a:t>
-            </a:r>
-            <a:endParaRPr lang="en-US" altLang="zh-CN" sz="2000" dirty="0" smtClean="0">
-              <a:solidFill>
-                <a:srgbClr val="FF0000"/>
-              </a:solidFill>
-            </a:endParaRPr>
-          </a:p>
-          <a:p>
+              <a:t>         If the node is not a leaf node, the node also contains a partition.</a:t>
+            </a:r>
             <a:endParaRPr lang="zh-CN" altLang="en-US" sz="2000" dirty="0">
               <a:solidFill>
                 <a:srgbClr val="FF0000"/>
@@ -6829,7 +6583,7 @@
           <a:lstStyle/>
           <a:p>
             <a:r>
-              <a:rPr lang="en-US" altLang="zh-CN" dirty="0" smtClean="0"/>
+              <a:rPr lang="en-US" altLang="zh-CN" dirty="0"/>
               <a:t>Merge two </a:t>
             </a:r>
             <a:r>
@@ -6885,7 +6639,7 @@
               <a:defRPr/>
             </a:pPr>
             <a:r>
-              <a:rPr lang="en-US" altLang="zh-CN" sz="1200" dirty="0" smtClean="0">
+              <a:rPr lang="en-US" altLang="zh-CN" sz="1200" dirty="0">
                 <a:solidFill>
                   <a:schemeClr val="tx1"/>
                 </a:solidFill>
@@ -7017,7 +6771,7 @@
                 <a:defRPr/>
               </a:pPr>
               <a:r>
-                <a:rPr lang="en-US" altLang="zh-CN" sz="1200" dirty="0" smtClean="0">
+                <a:rPr lang="en-US" altLang="zh-CN" sz="1200" dirty="0">
                   <a:solidFill>
                     <a:schemeClr val="tx1"/>
                   </a:solidFill>
@@ -7184,7 +6938,7 @@
                 <a:defRPr/>
               </a:pPr>
               <a:r>
-                <a:rPr lang="en-US" altLang="zh-CN" sz="1200" dirty="0" smtClean="0">
+                <a:rPr lang="en-US" altLang="zh-CN" sz="1200" dirty="0">
                   <a:solidFill>
                     <a:schemeClr val="tx1"/>
                   </a:solidFill>
@@ -7304,7 +7058,7 @@
                 <a:defRPr/>
               </a:pPr>
               <a:r>
-                <a:rPr lang="en-US" altLang="zh-CN" sz="1200" dirty="0" smtClean="0">
+                <a:rPr lang="en-US" altLang="zh-CN" sz="1200" dirty="0">
                   <a:solidFill>
                     <a:schemeClr val="tx1"/>
                   </a:solidFill>
@@ -7540,7 +7294,7 @@
               <a:defRPr/>
             </a:pPr>
             <a:r>
-              <a:rPr lang="en-US" altLang="zh-CN" sz="1200" dirty="0" smtClean="0">
+              <a:rPr lang="en-US" altLang="zh-CN" sz="1200" dirty="0">
                 <a:solidFill>
                   <a:schemeClr val="tx1"/>
                 </a:solidFill>
@@ -7598,7 +7352,7 @@
               <a:defRPr/>
             </a:pPr>
             <a:r>
-              <a:rPr lang="en-US" altLang="zh-CN" sz="1200" dirty="0" smtClean="0">
+              <a:rPr lang="en-US" altLang="zh-CN" sz="1200" dirty="0">
                 <a:solidFill>
                   <a:schemeClr val="tx1"/>
                 </a:solidFill>
@@ -7656,7 +7410,7 @@
               <a:defRPr/>
             </a:pPr>
             <a:r>
-              <a:rPr lang="en-US" altLang="zh-CN" sz="1200" dirty="0" smtClean="0">
+              <a:rPr lang="en-US" altLang="zh-CN" sz="1200" dirty="0">
                 <a:solidFill>
                   <a:schemeClr val="tx1"/>
                 </a:solidFill>
@@ -7744,7 +7498,7 @@
                   <a:defRPr/>
                 </a:pPr>
                 <a:r>
-                  <a:rPr lang="en-US" altLang="zh-CN" sz="1200" dirty="0" smtClean="0">
+                  <a:rPr lang="en-US" altLang="zh-CN" sz="1200" dirty="0">
                     <a:solidFill>
                       <a:schemeClr val="tx1"/>
                     </a:solidFill>
@@ -7865,7 +7619,7 @@
                   <a:defRPr/>
                 </a:pPr>
                 <a:r>
-                  <a:rPr lang="en-US" altLang="zh-CN" sz="1200" dirty="0" smtClean="0">
+                  <a:rPr lang="en-US" altLang="zh-CN" sz="1200" dirty="0">
                     <a:solidFill>
                       <a:schemeClr val="tx1"/>
                     </a:solidFill>
@@ -8145,7 +7899,7 @@
                 <a:defRPr/>
               </a:pPr>
               <a:r>
-                <a:rPr lang="en-US" altLang="zh-CN" sz="1200" dirty="0" smtClean="0">
+                <a:rPr lang="en-US" altLang="zh-CN" sz="1200" dirty="0">
                   <a:solidFill>
                     <a:schemeClr val="tx1"/>
                   </a:solidFill>
@@ -8203,7 +7957,7 @@
                 <a:defRPr/>
               </a:pPr>
               <a:r>
-                <a:rPr lang="en-US" altLang="zh-CN" sz="1200" dirty="0" smtClean="0">
+                <a:rPr lang="en-US" altLang="zh-CN" sz="1200" dirty="0">
                   <a:solidFill>
                     <a:schemeClr val="tx1"/>
                   </a:solidFill>
@@ -8261,7 +8015,7 @@
                 <a:defRPr/>
               </a:pPr>
               <a:r>
-                <a:rPr lang="en-US" altLang="zh-CN" sz="1200" dirty="0" smtClean="0">
+                <a:rPr lang="en-US" altLang="zh-CN" sz="1200" dirty="0">
                   <a:solidFill>
                     <a:schemeClr val="tx1"/>
                   </a:solidFill>
@@ -8319,7 +8073,7 @@
                 <a:defRPr/>
               </a:pPr>
               <a:r>
-                <a:rPr lang="en-US" altLang="zh-CN" sz="1200" dirty="0" smtClean="0">
+                <a:rPr lang="en-US" altLang="zh-CN" sz="1200" dirty="0">
                   <a:solidFill>
                     <a:schemeClr val="tx1"/>
                   </a:solidFill>
@@ -8392,7 +8146,7 @@
                 <a:defRPr/>
               </a:pPr>
               <a:r>
-                <a:rPr lang="en-US" altLang="zh-CN" sz="1200" dirty="0" smtClean="0">
+                <a:rPr lang="en-US" altLang="zh-CN" sz="1200" dirty="0">
                   <a:solidFill>
                     <a:schemeClr val="tx1"/>
                   </a:solidFill>
@@ -8450,7 +8204,7 @@
                 <a:defRPr/>
               </a:pPr>
               <a:r>
-                <a:rPr lang="en-US" altLang="zh-CN" sz="1200" dirty="0" smtClean="0">
+                <a:rPr lang="en-US" altLang="zh-CN" sz="1200" dirty="0">
                   <a:solidFill>
                     <a:schemeClr val="tx1"/>
                   </a:solidFill>
@@ -8570,7 +8324,7 @@
                   <a:defRPr/>
                 </a:pPr>
                 <a:r>
-                  <a:rPr lang="en-US" altLang="zh-CN" sz="1200" dirty="0" smtClean="0">
+                  <a:rPr lang="en-US" altLang="zh-CN" sz="1200" dirty="0">
                     <a:solidFill>
                       <a:schemeClr val="tx1"/>
                     </a:solidFill>
@@ -8762,7 +8516,7 @@
                 <a:defRPr/>
               </a:pPr>
               <a:r>
-                <a:rPr lang="en-US" altLang="zh-CN" sz="1200" dirty="0" smtClean="0">
+                <a:rPr lang="en-US" altLang="zh-CN" sz="1200" dirty="0">
                   <a:solidFill>
                     <a:schemeClr val="tx1"/>
                   </a:solidFill>
@@ -8820,7 +8574,7 @@
                 <a:defRPr/>
               </a:pPr>
               <a:r>
-                <a:rPr lang="en-US" altLang="zh-CN" sz="1200" dirty="0" smtClean="0">
+                <a:rPr lang="en-US" altLang="zh-CN" sz="1200" dirty="0">
                   <a:solidFill>
                     <a:schemeClr val="tx1"/>
                   </a:solidFill>
@@ -8861,7 +8615,7 @@
           <a:lstStyle/>
           <a:p>
             <a:r>
-              <a:rPr lang="en-US" altLang="zh-CN" dirty="0" smtClean="0"/>
+              <a:rPr lang="en-US" altLang="zh-CN" dirty="0"/>
               <a:t>Tree A</a:t>
             </a:r>
             <a:endParaRPr lang="zh-CN" altLang="en-US" dirty="0"/>
@@ -8891,7 +8645,7 @@
           <a:lstStyle/>
           <a:p>
             <a:r>
-              <a:rPr lang="en-US" altLang="zh-CN" dirty="0" smtClean="0"/>
+              <a:rPr lang="en-US" altLang="zh-CN" dirty="0"/>
               <a:t>Tree B</a:t>
             </a:r>
             <a:endParaRPr lang="zh-CN" altLang="en-US" dirty="0"/>
@@ -8907,7 +8661,7 @@
         <p:spPr>
           <a:xfrm>
             <a:off x="827584" y="1412776"/>
-            <a:ext cx="7632848" cy="646331"/>
+            <a:ext cx="7632848" cy="923330"/>
           </a:xfrm>
           <a:prstGeom prst="rect">
             <a:avLst/>
@@ -8920,96 +8674,48 @@
           <a:lstStyle/>
           <a:p>
             <a:r>
-              <a:rPr lang="en-US" altLang="zh-CN" dirty="0" smtClean="0"/>
-              <a:t>        </a:t>
-            </a:r>
-            <a:r>
-              <a:rPr lang="zh-CN" altLang="zh-CN" dirty="0" smtClean="0"/>
-              <a:t>在</a:t>
-            </a:r>
-            <a:r>
-              <a:rPr lang="zh-CN" altLang="zh-CN" dirty="0"/>
-              <a:t>对两个</a:t>
+              <a:rPr lang="en-US" altLang="zh-CN" dirty="0"/>
+              <a:t>When performing Merge operation on two </a:t>
             </a:r>
             <a:r>
               <a:rPr lang="en-US" altLang="zh-CN" dirty="0" err="1"/>
               <a:t>BspTree</a:t>
             </a:r>
             <a:r>
-              <a:rPr lang="zh-CN" altLang="zh-CN" dirty="0" smtClean="0"/>
-              <a:t>（为</a:t>
-            </a:r>
-            <a:r>
               <a:rPr lang="en-US" altLang="zh-CN" dirty="0"/>
-              <a:t>A</a:t>
-            </a:r>
-            <a:r>
-              <a:rPr lang="zh-CN" altLang="zh-CN" dirty="0"/>
-              <a:t>和</a:t>
-            </a:r>
-            <a:r>
-              <a:rPr lang="en-US" altLang="zh-CN" dirty="0"/>
-              <a:t>B</a:t>
-            </a:r>
-            <a:r>
-              <a:rPr lang="zh-CN" altLang="zh-CN" dirty="0"/>
-              <a:t>）进行</a:t>
-            </a:r>
-            <a:r>
-              <a:rPr lang="en-US" altLang="zh-CN" dirty="0"/>
-              <a:t>Merge</a:t>
-            </a:r>
-            <a:r>
-              <a:rPr lang="zh-CN" altLang="zh-CN" dirty="0"/>
-              <a:t>操作时，选择一个作为分割</a:t>
+              <a:t> (for A and B), select one as the split </a:t>
             </a:r>
             <a:r>
               <a:rPr lang="en-US" altLang="zh-CN" dirty="0" err="1"/>
               <a:t>BspTree</a:t>
             </a:r>
             <a:r>
-              <a:rPr lang="zh-CN" altLang="zh-CN" dirty="0"/>
-              <a:t>，一个作为被分割</a:t>
+              <a:rPr lang="en-US" altLang="zh-CN" dirty="0"/>
+              <a:t> and one as the split </a:t>
             </a:r>
             <a:r>
               <a:rPr lang="en-US" altLang="zh-CN" dirty="0" err="1"/>
               <a:t>BspTree</a:t>
             </a:r>
             <a:r>
-              <a:rPr lang="zh-CN" altLang="zh-CN" dirty="0" smtClean="0"/>
-              <a:t>。</a:t>
-            </a:r>
-            <a:r>
-              <a:rPr lang="en-US" altLang="zh-CN" dirty="0" smtClean="0"/>
-              <a:t>A</a:t>
-            </a:r>
-            <a:r>
-              <a:rPr lang="zh-CN" altLang="zh-CN" dirty="0"/>
-              <a:t>为分割</a:t>
+              <a:rPr lang="en-US" altLang="zh-CN" dirty="0"/>
+              <a:t>. A is the split </a:t>
             </a:r>
             <a:r>
               <a:rPr lang="en-US" altLang="zh-CN" dirty="0" err="1"/>
               <a:t>BspTree</a:t>
             </a:r>
             <a:r>
-              <a:rPr lang="zh-CN" altLang="zh-CN" dirty="0"/>
-              <a:t>，</a:t>
-            </a:r>
-            <a:r>
               <a:rPr lang="en-US" altLang="zh-CN" dirty="0"/>
-              <a:t>B</a:t>
-            </a:r>
-            <a:r>
-              <a:rPr lang="zh-CN" altLang="zh-CN" dirty="0"/>
-              <a:t>为被分割</a:t>
+              <a:t>, B is the split </a:t>
             </a:r>
             <a:r>
               <a:rPr lang="en-US" altLang="zh-CN" dirty="0" err="1"/>
               <a:t>BspTree</a:t>
             </a:r>
             <a:r>
-              <a:rPr lang="zh-CN" altLang="zh-CN" dirty="0"/>
-              <a:t>。</a:t>
+              <a:rPr lang="en-US" altLang="zh-CN" dirty="0"/>
+              <a:t>.</a:t>
             </a:r>
             <a:endParaRPr lang="zh-CN" altLang="en-US" dirty="0"/>
           </a:p>
@@ -9084,7 +8790,7 @@
                   <a:defRPr/>
                 </a:pPr>
                 <a:r>
-                  <a:rPr lang="en-US" altLang="zh-CN" sz="1200" dirty="0" smtClean="0">
+                  <a:rPr lang="en-US" altLang="zh-CN" sz="1200" dirty="0">
                     <a:solidFill>
                       <a:schemeClr val="tx1"/>
                     </a:solidFill>
@@ -9158,7 +8864,7 @@
                     <a:defRPr/>
                   </a:pPr>
                   <a:r>
-                    <a:rPr lang="en-US" altLang="zh-CN" sz="1200" dirty="0" smtClean="0">
+                    <a:rPr lang="en-US" altLang="zh-CN" sz="1200" dirty="0">
                       <a:solidFill>
                         <a:schemeClr val="tx1"/>
                       </a:solidFill>
@@ -9394,7 +9100,7 @@
                   <a:defRPr/>
                 </a:pPr>
                 <a:r>
-                  <a:rPr lang="en-US" altLang="zh-CN" sz="1200" dirty="0" smtClean="0">
+                  <a:rPr lang="en-US" altLang="zh-CN" sz="1200" dirty="0">
                     <a:solidFill>
                       <a:schemeClr val="tx1"/>
                     </a:solidFill>
@@ -9452,7 +9158,7 @@
                   <a:defRPr/>
                 </a:pPr>
                 <a:r>
-                  <a:rPr lang="en-US" altLang="zh-CN" sz="1200" dirty="0" smtClean="0">
+                  <a:rPr lang="en-US" altLang="zh-CN" sz="1200" dirty="0">
                     <a:solidFill>
                       <a:schemeClr val="tx1"/>
                     </a:solidFill>
@@ -9510,7 +9216,7 @@
                   <a:defRPr/>
                 </a:pPr>
                 <a:r>
-                  <a:rPr lang="en-US" altLang="zh-CN" sz="1200" dirty="0" smtClean="0">
+                  <a:rPr lang="en-US" altLang="zh-CN" sz="1200" dirty="0">
                     <a:solidFill>
                       <a:schemeClr val="tx1"/>
                     </a:solidFill>
@@ -9551,7 +9257,7 @@
             <a:lstStyle/>
             <a:p>
               <a:r>
-                <a:rPr lang="en-US" altLang="zh-CN" dirty="0" err="1" smtClean="0"/>
+                <a:rPr lang="en-US" altLang="zh-CN" dirty="0" err="1"/>
                 <a:t>B_Left</a:t>
               </a:r>
               <a:endParaRPr lang="zh-CN" altLang="en-US" dirty="0"/>
@@ -9656,7 +9362,7 @@
                       <a:defRPr/>
                     </a:pPr>
                     <a:r>
-                      <a:rPr lang="en-US" altLang="zh-CN" sz="1200" dirty="0" smtClean="0">
+                      <a:rPr lang="en-US" altLang="zh-CN" sz="1200" dirty="0">
                         <a:solidFill>
                           <a:schemeClr val="tx1"/>
                         </a:solidFill>
@@ -9714,7 +9420,7 @@
                       <a:defRPr/>
                     </a:pPr>
                     <a:r>
-                      <a:rPr lang="en-US" altLang="zh-CN" sz="1200" dirty="0" smtClean="0">
+                      <a:rPr lang="en-US" altLang="zh-CN" sz="1200" dirty="0">
                         <a:solidFill>
                           <a:schemeClr val="tx1"/>
                         </a:solidFill>
@@ -9834,7 +9540,7 @@
                         <a:defRPr/>
                       </a:pPr>
                       <a:r>
-                        <a:rPr lang="en-US" altLang="zh-CN" sz="1200" dirty="0" smtClean="0">
+                        <a:rPr lang="en-US" altLang="zh-CN" sz="1200" dirty="0">
                           <a:solidFill>
                             <a:schemeClr val="tx1"/>
                           </a:solidFill>
@@ -10026,7 +9732,7 @@
                       <a:defRPr/>
                     </a:pPr>
                     <a:r>
-                      <a:rPr lang="en-US" altLang="zh-CN" sz="1200" dirty="0" smtClean="0">
+                      <a:rPr lang="en-US" altLang="zh-CN" sz="1200" dirty="0">
                         <a:solidFill>
                           <a:schemeClr val="tx1"/>
                         </a:solidFill>
@@ -10084,7 +9790,7 @@
                       <a:defRPr/>
                     </a:pPr>
                     <a:r>
-                      <a:rPr lang="en-US" altLang="zh-CN" sz="1200" dirty="0" smtClean="0">
+                      <a:rPr lang="en-US" altLang="zh-CN" sz="1200" dirty="0">
                         <a:solidFill>
                           <a:schemeClr val="tx1"/>
                         </a:solidFill>
@@ -10187,7 +9893,7 @@
                     <a:defRPr/>
                   </a:pPr>
                   <a:r>
-                    <a:rPr lang="en-US" altLang="zh-CN" sz="1200" dirty="0" smtClean="0">
+                    <a:rPr lang="en-US" altLang="zh-CN" sz="1200" dirty="0">
                       <a:solidFill>
                         <a:schemeClr val="tx1"/>
                       </a:solidFill>
@@ -10228,7 +9934,7 @@
               <a:lstStyle/>
               <a:p>
                 <a:r>
-                  <a:rPr lang="en-US" altLang="zh-CN" dirty="0" err="1" smtClean="0"/>
+                  <a:rPr lang="en-US" altLang="zh-CN" dirty="0" err="1"/>
                   <a:t>B_Right</a:t>
                 </a:r>
                 <a:endParaRPr lang="zh-CN" altLang="en-US" dirty="0"/>
@@ -10335,7 +10041,7 @@
                   <a:defRPr/>
                 </a:pPr>
                 <a:r>
-                  <a:rPr lang="en-US" altLang="zh-CN" sz="1200" dirty="0" smtClean="0">
+                  <a:rPr lang="en-US" altLang="zh-CN" sz="1200" dirty="0">
                     <a:solidFill>
                       <a:schemeClr val="tx1"/>
                     </a:solidFill>
@@ -11078,7 +10784,7 @@
           <a:lstStyle/>
           <a:p>
             <a:r>
-              <a:rPr lang="en-US" altLang="zh-CN" dirty="0" smtClean="0"/>
+              <a:rPr lang="en-US" altLang="zh-CN" dirty="0"/>
               <a:t>Merge two </a:t>
             </a:r>
             <a:r>
@@ -11101,8 +10807,8 @@
         </p:nvSpPr>
         <p:spPr>
           <a:xfrm>
-            <a:off x="683568" y="1340768"/>
-            <a:ext cx="7776864" cy="923330"/>
+            <a:off x="430378" y="1334953"/>
+            <a:ext cx="11089232" cy="923330"/>
           </a:xfrm>
           <a:prstGeom prst="rect">
             <a:avLst/>
@@ -11115,61 +10821,24 @@
           <a:lstStyle/>
           <a:p>
             <a:r>
-              <a:rPr lang="en-US" altLang="zh-CN" dirty="0" smtClean="0"/>
-              <a:t>        </a:t>
-            </a:r>
-            <a:r>
-              <a:rPr lang="zh-CN" altLang="en-US" dirty="0" smtClean="0"/>
-              <a:t>当发现</a:t>
-            </a:r>
-            <a:r>
-              <a:rPr lang="en-US" altLang="zh-CN" dirty="0" smtClean="0"/>
-              <a:t>A</a:t>
-            </a:r>
-            <a:r>
-              <a:rPr lang="zh-CN" altLang="en-US" dirty="0" smtClean="0"/>
-              <a:t>或者</a:t>
-            </a:r>
-            <a:r>
-              <a:rPr lang="en-US" altLang="zh-CN" dirty="0" smtClean="0"/>
-              <a:t>B</a:t>
-            </a:r>
-            <a:r>
-              <a:rPr lang="zh-CN" altLang="en-US" dirty="0" smtClean="0"/>
-              <a:t>中有一个为叶子节点时，就使用了叶子合并算法，这里对不同的布尔运算操作进行了相应的处理。</a:t>
-            </a:r>
-            <a:endParaRPr lang="en-US" altLang="zh-CN" dirty="0" smtClean="0"/>
-          </a:p>
-          <a:p>
-            <a:r>
               <a:rPr lang="en-US" altLang="zh-CN" dirty="0"/>
-              <a:t> </a:t>
-            </a:r>
-            <a:r>
-              <a:rPr lang="en-US" altLang="zh-CN" dirty="0" smtClean="0"/>
-              <a:t>       </a:t>
-            </a:r>
-            <a:r>
-              <a:rPr lang="en-US" altLang="zh-CN" b="1" dirty="0" smtClean="0">
+              <a:t>When one of A or B is found to be a leaf node, the leaf merging algorithm is used, and different Boolean operations are processed accordingly.</a:t>
+            </a:r>
+          </a:p>
+          <a:p>
+            <a:r>
+              <a:rPr lang="en-US" altLang="zh-CN" b="1" dirty="0">
                 <a:solidFill>
-                  <a:schemeClr val="tx1"/>
+                  <a:srgbClr val="FF0000"/>
                 </a:solidFill>
-                <a:latin typeface="Times New Roman" panose="02020603050405020304" pitchFamily="18" charset="0"/>
-                <a:cs typeface="Times New Roman" panose="02020603050405020304" pitchFamily="18" charset="0"/>
               </a:rPr>
-              <a:t>Merging BSP trees yields polyhedral set operations</a:t>
-            </a:r>
-            <a:r>
-              <a:rPr lang="zh-CN" altLang="en-US" b="1" dirty="0" smtClean="0">
-                <a:solidFill>
-                  <a:schemeClr val="tx1"/>
-                </a:solidFill>
-                <a:latin typeface="Times New Roman" panose="02020603050405020304" pitchFamily="18" charset="0"/>
-                <a:cs typeface="Times New Roman" panose="02020603050405020304" pitchFamily="18" charset="0"/>
-              </a:rPr>
-              <a:t>文章中有错。</a:t>
-            </a:r>
-            <a:endParaRPr lang="zh-CN" altLang="en-US" dirty="0"/>
+              <a:t>         There is an error in the Merging BSP trees yields polyhedral set operations article.</a:t>
+            </a:r>
+            <a:endParaRPr lang="zh-CN" altLang="en-US" b="1" dirty="0">
+              <a:solidFill>
+                <a:srgbClr val="FF0000"/>
+              </a:solidFill>
+            </a:endParaRPr>
           </a:p>
         </p:txBody>
       </p:sp>
@@ -11195,14 +10864,14 @@
           <a:lstStyle/>
           <a:p>
             <a:r>
-              <a:rPr lang="en-US" altLang="zh-CN" sz="1600" dirty="0" err="1" smtClean="0">
+              <a:rPr lang="en-US" altLang="zh-CN" sz="1600" dirty="0" err="1">
                 <a:latin typeface="Times New Roman" panose="02020603050405020304" pitchFamily="18" charset="0"/>
                 <a:cs typeface="Times New Roman" panose="02020603050405020304" pitchFamily="18" charset="0"/>
               </a:rPr>
               <a:t>Merge_Tree_With_Cell</a:t>
             </a:r>
             <a:r>
-              <a:rPr lang="en-US" altLang="zh-CN" sz="1600" dirty="0" smtClean="0">
+              <a:rPr lang="en-US" altLang="zh-CN" sz="1600" dirty="0">
                 <a:latin typeface="Times New Roman" panose="02020603050405020304" pitchFamily="18" charset="0"/>
                 <a:cs typeface="Times New Roman" panose="02020603050405020304" pitchFamily="18" charset="0"/>
                 <a:sym typeface="Wingdings" pitchFamily="2" charset="2"/>
@@ -11210,7 +10879,7 @@
               <a:t>:(</a:t>
             </a:r>
             <a:r>
-              <a:rPr lang="en-US" altLang="zh-CN" sz="1600" dirty="0" err="1" smtClean="0">
+              <a:rPr lang="en-US" altLang="zh-CN" sz="1600" dirty="0" err="1">
                 <a:latin typeface="Times New Roman" panose="02020603050405020304" pitchFamily="18" charset="0"/>
                 <a:cs typeface="Times New Roman" panose="02020603050405020304" pitchFamily="18" charset="0"/>
                 <a:sym typeface="Wingdings" pitchFamily="2" charset="2"/>
@@ -11218,7 +10887,7 @@
               <a:t>A,B:BspTree</a:t>
             </a:r>
             <a:r>
-              <a:rPr lang="en-US" altLang="zh-CN" sz="1600" dirty="0" smtClean="0">
+              <a:rPr lang="en-US" altLang="zh-CN" sz="1600" dirty="0">
                 <a:latin typeface="Times New Roman" panose="02020603050405020304" pitchFamily="18" charset="0"/>
                 <a:cs typeface="Times New Roman" panose="02020603050405020304" pitchFamily="18" charset="0"/>
                 <a:sym typeface="Wingdings" pitchFamily="2" charset="2"/>
@@ -11226,14 +10895,14 @@
               <a:t>) -&gt; </a:t>
             </a:r>
             <a:r>
-              <a:rPr lang="en-US" altLang="zh-CN" sz="1600" dirty="0" err="1" smtClean="0">
+              <a:rPr lang="en-US" altLang="zh-CN" sz="1600" dirty="0" err="1">
                 <a:latin typeface="Times New Roman" panose="02020603050405020304" pitchFamily="18" charset="0"/>
                 <a:cs typeface="Times New Roman" panose="02020603050405020304" pitchFamily="18" charset="0"/>
                 <a:sym typeface="Wingdings" pitchFamily="2" charset="2"/>
               </a:rPr>
               <a:t>BspTree</a:t>
             </a:r>
-            <a:endParaRPr lang="en-US" altLang="zh-CN" sz="1600" dirty="0" smtClean="0">
+            <a:endParaRPr lang="en-US" altLang="zh-CN" sz="1600" dirty="0">
               <a:latin typeface="Times New Roman" panose="02020603050405020304" pitchFamily="18" charset="0"/>
               <a:cs typeface="Times New Roman" panose="02020603050405020304" pitchFamily="18" charset="0"/>
               <a:sym typeface="Wingdings" pitchFamily="2" charset="2"/>
@@ -11241,7 +10910,7 @@
           </a:p>
           <a:p>
             <a:r>
-              <a:rPr lang="en-US" altLang="zh-CN" sz="1600" dirty="0" smtClean="0">
+              <a:rPr lang="en-US" altLang="zh-CN" sz="1600" dirty="0">
                 <a:latin typeface="Times New Roman" panose="02020603050405020304" pitchFamily="18" charset="0"/>
                 <a:cs typeface="Times New Roman" panose="02020603050405020304" pitchFamily="18" charset="0"/>
                 <a:sym typeface="Wingdings" pitchFamily="2" charset="2"/>
@@ -11251,7 +10920,7 @@
           </a:p>
           <a:p>
             <a:r>
-              <a:rPr lang="en-US" altLang="zh-CN" sz="1600" dirty="0" smtClean="0">
+              <a:rPr lang="en-US" altLang="zh-CN" sz="1600" dirty="0">
                 <a:latin typeface="Times New Roman" panose="02020603050405020304" pitchFamily="18" charset="0"/>
                 <a:cs typeface="Times New Roman" panose="02020603050405020304" pitchFamily="18" charset="0"/>
                 <a:sym typeface="Wingdings" pitchFamily="2" charset="2"/>
@@ -11261,7 +10930,7 @@
           </a:p>
           <a:p>
             <a:r>
-              <a:rPr lang="en-US" altLang="zh-CN" sz="1600" dirty="0" smtClean="0">
+              <a:rPr lang="en-US" altLang="zh-CN" sz="1600" dirty="0">
                 <a:latin typeface="Times New Roman" panose="02020603050405020304" pitchFamily="18" charset="0"/>
                 <a:cs typeface="Times New Roman" panose="02020603050405020304" pitchFamily="18" charset="0"/>
                 <a:sym typeface="Wingdings" pitchFamily="2" charset="2"/>
@@ -11269,14 +10938,14 @@
               <a:t>         IF  </a:t>
             </a:r>
             <a:r>
-              <a:rPr lang="en-US" altLang="zh-CN" sz="1600" dirty="0" err="1" smtClean="0">
+              <a:rPr lang="en-US" altLang="zh-CN" sz="1600" dirty="0" err="1">
                 <a:latin typeface="Times New Roman" panose="02020603050405020304" pitchFamily="18" charset="0"/>
                 <a:cs typeface="Times New Roman" panose="02020603050405020304" pitchFamily="18" charset="0"/>
                 <a:sym typeface="Wingdings" pitchFamily="2" charset="2"/>
               </a:rPr>
               <a:t>A.is_an_InCell</a:t>
             </a:r>
-            <a:endParaRPr lang="en-US" altLang="zh-CN" sz="1600" dirty="0" smtClean="0">
+            <a:endParaRPr lang="en-US" altLang="zh-CN" sz="1600" dirty="0">
               <a:latin typeface="Times New Roman" panose="02020603050405020304" pitchFamily="18" charset="0"/>
               <a:cs typeface="Times New Roman" panose="02020603050405020304" pitchFamily="18" charset="0"/>
               <a:sym typeface="Wingdings" pitchFamily="2" charset="2"/>
@@ -11284,7 +10953,7 @@
           </a:p>
           <a:p>
             <a:r>
-              <a:rPr lang="en-US" altLang="zh-CN" sz="1600" dirty="0" smtClean="0">
+              <a:rPr lang="en-US" altLang="zh-CN" sz="1600" dirty="0">
                 <a:latin typeface="Times New Roman" panose="02020603050405020304" pitchFamily="18" charset="0"/>
                 <a:cs typeface="Times New Roman" panose="02020603050405020304" pitchFamily="18" charset="0"/>
                 <a:sym typeface="Wingdings" pitchFamily="2" charset="2"/>
@@ -11294,7 +10963,7 @@
           </a:p>
           <a:p>
             <a:r>
-              <a:rPr lang="en-US" altLang="zh-CN" sz="1600" dirty="0" smtClean="0">
+              <a:rPr lang="en-US" altLang="zh-CN" sz="1600" dirty="0">
                 <a:latin typeface="Times New Roman" panose="02020603050405020304" pitchFamily="18" charset="0"/>
                 <a:cs typeface="Times New Roman" panose="02020603050405020304" pitchFamily="18" charset="0"/>
                 <a:sym typeface="Wingdings" pitchFamily="2" charset="2"/>
@@ -11304,7 +10973,7 @@
           </a:p>
           <a:p>
             <a:r>
-              <a:rPr lang="en-US" altLang="zh-CN" sz="1600" dirty="0" smtClean="0">
+              <a:rPr lang="en-US" altLang="zh-CN" sz="1600" dirty="0">
                 <a:latin typeface="Times New Roman" panose="02020603050405020304" pitchFamily="18" charset="0"/>
                 <a:cs typeface="Times New Roman" panose="02020603050405020304" pitchFamily="18" charset="0"/>
                 <a:sym typeface="Wingdings" pitchFamily="2" charset="2"/>
@@ -11314,7 +10983,7 @@
           </a:p>
           <a:p>
             <a:r>
-              <a:rPr lang="en-US" altLang="zh-CN" sz="1600" dirty="0" smtClean="0">
+              <a:rPr lang="en-US" altLang="zh-CN" sz="1600" dirty="0">
                 <a:latin typeface="Times New Roman" panose="02020603050405020304" pitchFamily="18" charset="0"/>
                 <a:cs typeface="Times New Roman" panose="02020603050405020304" pitchFamily="18" charset="0"/>
                 <a:sym typeface="Wingdings" pitchFamily="2" charset="2"/>
@@ -11324,7 +10993,7 @@
           </a:p>
           <a:p>
             <a:r>
-              <a:rPr lang="en-US" altLang="zh-CN" sz="1600" dirty="0" smtClean="0">
+              <a:rPr lang="en-US" altLang="zh-CN" sz="1600" dirty="0">
                 <a:latin typeface="Times New Roman" panose="02020603050405020304" pitchFamily="18" charset="0"/>
                 <a:cs typeface="Times New Roman" panose="02020603050405020304" pitchFamily="18" charset="0"/>
                 <a:sym typeface="Wingdings" pitchFamily="2" charset="2"/>
@@ -11332,7 +11001,7 @@
               <a:t>                    Difference -&gt;</a:t>
             </a:r>
             <a:r>
-              <a:rPr lang="en-US" altLang="zh-CN" sz="1600" dirty="0" err="1" smtClean="0">
+              <a:rPr lang="en-US" altLang="zh-CN" sz="1600" dirty="0" err="1">
                 <a:latin typeface="Times New Roman" panose="02020603050405020304" pitchFamily="18" charset="0"/>
                 <a:cs typeface="Times New Roman" panose="02020603050405020304" pitchFamily="18" charset="0"/>
                 <a:sym typeface="Wingdings" pitchFamily="2" charset="2"/>
@@ -11340,7 +11009,7 @@
               <a:t>Complement_BspTree</a:t>
             </a:r>
             <a:r>
-              <a:rPr lang="en-US" altLang="zh-CN" sz="1600" dirty="0" smtClean="0">
+              <a:rPr lang="en-US" altLang="zh-CN" sz="1600" dirty="0">
                 <a:latin typeface="Times New Roman" panose="02020603050405020304" pitchFamily="18" charset="0"/>
                 <a:cs typeface="Times New Roman" panose="02020603050405020304" pitchFamily="18" charset="0"/>
                 <a:sym typeface="Wingdings" pitchFamily="2" charset="2"/>
@@ -11350,7 +11019,7 @@
           </a:p>
           <a:p>
             <a:r>
-              <a:rPr lang="en-US" altLang="zh-CN" sz="1600" dirty="0" smtClean="0">
+              <a:rPr lang="en-US" altLang="zh-CN" sz="1600" dirty="0">
                 <a:latin typeface="Times New Roman" panose="02020603050405020304" pitchFamily="18" charset="0"/>
                 <a:cs typeface="Times New Roman" panose="02020603050405020304" pitchFamily="18" charset="0"/>
                 <a:sym typeface="Wingdings" pitchFamily="2" charset="2"/>
@@ -11360,7 +11029,7 @@
           </a:p>
           <a:p>
             <a:r>
-              <a:rPr lang="en-US" altLang="zh-CN" sz="1600" dirty="0" smtClean="0">
+              <a:rPr lang="en-US" altLang="zh-CN" sz="1600" dirty="0">
                 <a:latin typeface="Times New Roman" panose="02020603050405020304" pitchFamily="18" charset="0"/>
                 <a:cs typeface="Times New Roman" panose="02020603050405020304" pitchFamily="18" charset="0"/>
                 <a:sym typeface="Wingdings" pitchFamily="2" charset="2"/>
@@ -11368,14 +11037,14 @@
               <a:t>          ELSE IF </a:t>
             </a:r>
             <a:r>
-              <a:rPr lang="en-US" altLang="zh-CN" sz="1600" dirty="0" err="1" smtClean="0">
+              <a:rPr lang="en-US" altLang="zh-CN" sz="1600" dirty="0" err="1">
                 <a:latin typeface="Times New Roman" panose="02020603050405020304" pitchFamily="18" charset="0"/>
                 <a:cs typeface="Times New Roman" panose="02020603050405020304" pitchFamily="18" charset="0"/>
                 <a:sym typeface="Wingdings" pitchFamily="2" charset="2"/>
               </a:rPr>
               <a:t>A.is_an_OutCell</a:t>
             </a:r>
-            <a:endParaRPr lang="en-US" altLang="zh-CN" sz="1600" dirty="0" smtClean="0">
+            <a:endParaRPr lang="en-US" altLang="zh-CN" sz="1600" dirty="0">
               <a:latin typeface="Times New Roman" panose="02020603050405020304" pitchFamily="18" charset="0"/>
               <a:cs typeface="Times New Roman" panose="02020603050405020304" pitchFamily="18" charset="0"/>
               <a:sym typeface="Wingdings" pitchFamily="2" charset="2"/>
@@ -11383,7 +11052,7 @@
           </a:p>
           <a:p>
             <a:r>
-              <a:rPr lang="en-US" altLang="zh-CN" sz="1600" dirty="0" smtClean="0">
+              <a:rPr lang="en-US" altLang="zh-CN" sz="1600" dirty="0">
                 <a:latin typeface="Times New Roman" panose="02020603050405020304" pitchFamily="18" charset="0"/>
                 <a:cs typeface="Times New Roman" panose="02020603050405020304" pitchFamily="18" charset="0"/>
                 <a:sym typeface="Wingdings" pitchFamily="2" charset="2"/>
@@ -11393,7 +11062,7 @@
           </a:p>
           <a:p>
             <a:r>
-              <a:rPr lang="en-US" altLang="zh-CN" sz="1600" dirty="0" smtClean="0">
+              <a:rPr lang="en-US" altLang="zh-CN" sz="1600" dirty="0">
                 <a:latin typeface="Times New Roman" panose="02020603050405020304" pitchFamily="18" charset="0"/>
                 <a:cs typeface="Times New Roman" panose="02020603050405020304" pitchFamily="18" charset="0"/>
                 <a:sym typeface="Wingdings" pitchFamily="2" charset="2"/>
@@ -11403,7 +11072,7 @@
           </a:p>
           <a:p>
             <a:r>
-              <a:rPr lang="en-US" altLang="zh-CN" sz="1600" dirty="0" smtClean="0">
+              <a:rPr lang="en-US" altLang="zh-CN" sz="1600" dirty="0">
                 <a:latin typeface="Times New Roman" panose="02020603050405020304" pitchFamily="18" charset="0"/>
                 <a:cs typeface="Times New Roman" panose="02020603050405020304" pitchFamily="18" charset="0"/>
                 <a:sym typeface="Wingdings" pitchFamily="2" charset="2"/>
@@ -11413,7 +11082,7 @@
           </a:p>
           <a:p>
             <a:r>
-              <a:rPr lang="en-US" altLang="zh-CN" sz="1600" dirty="0" smtClean="0">
+              <a:rPr lang="en-US" altLang="zh-CN" sz="1600" dirty="0">
                 <a:latin typeface="Times New Roman" panose="02020603050405020304" pitchFamily="18" charset="0"/>
                 <a:cs typeface="Times New Roman" panose="02020603050405020304" pitchFamily="18" charset="0"/>
                 <a:sym typeface="Wingdings" pitchFamily="2" charset="2"/>
@@ -11423,7 +11092,7 @@
           </a:p>
           <a:p>
             <a:r>
-              <a:rPr lang="en-US" altLang="zh-CN" sz="1600" dirty="0" smtClean="0">
+              <a:rPr lang="en-US" altLang="zh-CN" sz="1600" dirty="0">
                 <a:latin typeface="Times New Roman" panose="02020603050405020304" pitchFamily="18" charset="0"/>
                 <a:cs typeface="Times New Roman" panose="02020603050405020304" pitchFamily="18" charset="0"/>
                 <a:sym typeface="Wingdings" pitchFamily="2" charset="2"/>
@@ -11433,7 +11102,7 @@
           </a:p>
           <a:p>
             <a:r>
-              <a:rPr lang="en-US" altLang="zh-CN" sz="1600" dirty="0" smtClean="0">
+              <a:rPr lang="en-US" altLang="zh-CN" sz="1600" dirty="0">
                 <a:latin typeface="Times New Roman" panose="02020603050405020304" pitchFamily="18" charset="0"/>
                 <a:cs typeface="Times New Roman" panose="02020603050405020304" pitchFamily="18" charset="0"/>
                 <a:sym typeface="Wingdings" pitchFamily="2" charset="2"/>
@@ -11443,14 +11112,14 @@
           </a:p>
           <a:p>
             <a:r>
-              <a:rPr lang="en-US" altLang="zh-CN" dirty="0" smtClean="0">
+              <a:rPr lang="en-US" altLang="zh-CN" dirty="0">
                 <a:latin typeface="Times New Roman" panose="02020603050405020304" pitchFamily="18" charset="0"/>
                 <a:cs typeface="Times New Roman" panose="02020603050405020304" pitchFamily="18" charset="0"/>
                 <a:sym typeface="Wingdings" pitchFamily="2" charset="2"/>
               </a:rPr>
               <a:t>          </a:t>
             </a:r>
-            <a:endParaRPr lang="zh-CN" altLang="en-US" dirty="0" smtClean="0">
+            <a:endParaRPr lang="zh-CN" altLang="en-US" dirty="0">
               <a:latin typeface="Times New Roman" panose="02020603050405020304" pitchFamily="18" charset="0"/>
               <a:cs typeface="Times New Roman" panose="02020603050405020304" pitchFamily="18" charset="0"/>
             </a:endParaRPr>
@@ -11479,7 +11148,7 @@
           <a:lstStyle/>
           <a:p>
             <a:r>
-              <a:rPr lang="en-US" altLang="zh-CN" sz="1600" dirty="0" smtClean="0">
+              <a:rPr lang="en-US" altLang="zh-CN" sz="1600" dirty="0">
                 <a:latin typeface="Times New Roman" panose="02020603050405020304" pitchFamily="18" charset="0"/>
                 <a:cs typeface="Times New Roman" panose="02020603050405020304" pitchFamily="18" charset="0"/>
                 <a:sym typeface="Wingdings" pitchFamily="2" charset="2"/>
@@ -11487,14 +11156,14 @@
               <a:t>ELSE IF </a:t>
             </a:r>
             <a:r>
-              <a:rPr lang="en-US" altLang="zh-CN" sz="1600" dirty="0" err="1" smtClean="0">
+              <a:rPr lang="en-US" altLang="zh-CN" sz="1600" dirty="0" err="1">
                 <a:latin typeface="Times New Roman" panose="02020603050405020304" pitchFamily="18" charset="0"/>
                 <a:cs typeface="Times New Roman" panose="02020603050405020304" pitchFamily="18" charset="0"/>
                 <a:sym typeface="Wingdings" pitchFamily="2" charset="2"/>
               </a:rPr>
               <a:t>B.is_an_InCell</a:t>
             </a:r>
-            <a:endParaRPr lang="en-US" altLang="zh-CN" sz="1600" dirty="0" smtClean="0">
+            <a:endParaRPr lang="en-US" altLang="zh-CN" sz="1600" dirty="0">
               <a:latin typeface="Times New Roman" panose="02020603050405020304" pitchFamily="18" charset="0"/>
               <a:cs typeface="Times New Roman" panose="02020603050405020304" pitchFamily="18" charset="0"/>
               <a:sym typeface="Wingdings" pitchFamily="2" charset="2"/>
@@ -11502,7 +11171,7 @@
           </a:p>
           <a:p>
             <a:r>
-              <a:rPr lang="en-US" altLang="zh-CN" sz="1600" dirty="0" smtClean="0">
+              <a:rPr lang="en-US" altLang="zh-CN" sz="1600" dirty="0">
                 <a:latin typeface="Times New Roman" panose="02020603050405020304" pitchFamily="18" charset="0"/>
                 <a:cs typeface="Times New Roman" panose="02020603050405020304" pitchFamily="18" charset="0"/>
                 <a:sym typeface="Wingdings" pitchFamily="2" charset="2"/>
@@ -11512,7 +11181,7 @@
           </a:p>
           <a:p>
             <a:r>
-              <a:rPr lang="en-US" altLang="zh-CN" sz="1600" dirty="0" smtClean="0">
+              <a:rPr lang="en-US" altLang="zh-CN" sz="1600" dirty="0">
                 <a:latin typeface="Times New Roman" panose="02020603050405020304" pitchFamily="18" charset="0"/>
                 <a:cs typeface="Times New Roman" panose="02020603050405020304" pitchFamily="18" charset="0"/>
                 <a:sym typeface="Wingdings" pitchFamily="2" charset="2"/>
@@ -11522,7 +11191,7 @@
           </a:p>
           <a:p>
             <a:r>
-              <a:rPr lang="en-US" altLang="zh-CN" sz="1600" dirty="0" smtClean="0">
+              <a:rPr lang="en-US" altLang="zh-CN" sz="1600" dirty="0">
                 <a:latin typeface="Times New Roman" panose="02020603050405020304" pitchFamily="18" charset="0"/>
                 <a:cs typeface="Times New Roman" panose="02020603050405020304" pitchFamily="18" charset="0"/>
               </a:rPr>
@@ -11531,7 +11200,7 @@
           </a:p>
           <a:p>
             <a:r>
-              <a:rPr lang="en-US" altLang="zh-CN" sz="1600" dirty="0" smtClean="0">
+              <a:rPr lang="en-US" altLang="zh-CN" sz="1600" dirty="0">
                 <a:latin typeface="Times New Roman" panose="02020603050405020304" pitchFamily="18" charset="0"/>
                 <a:cs typeface="Times New Roman" panose="02020603050405020304" pitchFamily="18" charset="0"/>
               </a:rPr>
@@ -11540,27 +11209,27 @@
           </a:p>
           <a:p>
             <a:r>
-              <a:rPr lang="en-US" altLang="zh-CN" sz="1600" dirty="0" smtClean="0">
+              <a:rPr lang="en-US" altLang="zh-CN" sz="1600" dirty="0">
                 <a:latin typeface="Times New Roman" panose="02020603050405020304" pitchFamily="18" charset="0"/>
                 <a:cs typeface="Times New Roman" panose="02020603050405020304" pitchFamily="18" charset="0"/>
               </a:rPr>
               <a:t>                        Difference -&gt; </a:t>
             </a:r>
             <a:r>
-              <a:rPr lang="en-US" altLang="zh-CN" sz="1600" dirty="0" err="1" smtClean="0">
+              <a:rPr lang="en-US" altLang="zh-CN" sz="1600" dirty="0" err="1">
                 <a:latin typeface="Times New Roman" panose="02020603050405020304" pitchFamily="18" charset="0"/>
                 <a:cs typeface="Times New Roman" panose="02020603050405020304" pitchFamily="18" charset="0"/>
               </a:rPr>
               <a:t>OutCell</a:t>
             </a:r>
-            <a:endParaRPr lang="en-US" altLang="zh-CN" sz="1600" dirty="0" smtClean="0">
+            <a:endParaRPr lang="en-US" altLang="zh-CN" sz="1600" dirty="0">
               <a:latin typeface="Times New Roman" panose="02020603050405020304" pitchFamily="18" charset="0"/>
               <a:cs typeface="Times New Roman" panose="02020603050405020304" pitchFamily="18" charset="0"/>
             </a:endParaRPr>
           </a:p>
           <a:p>
             <a:r>
-              <a:rPr lang="en-US" altLang="zh-CN" sz="1600" dirty="0" smtClean="0">
+              <a:rPr lang="en-US" altLang="zh-CN" sz="1600" dirty="0">
                 <a:latin typeface="Times New Roman" panose="02020603050405020304" pitchFamily="18" charset="0"/>
                 <a:cs typeface="Times New Roman" panose="02020603050405020304" pitchFamily="18" charset="0"/>
               </a:rPr>
@@ -11569,7 +11238,7 @@
           </a:p>
           <a:p>
             <a:r>
-              <a:rPr lang="en-US" altLang="zh-CN" sz="1600" dirty="0" smtClean="0">
+              <a:rPr lang="en-US" altLang="zh-CN" sz="1600" dirty="0">
                 <a:latin typeface="Times New Roman" panose="02020603050405020304" pitchFamily="18" charset="0"/>
                 <a:cs typeface="Times New Roman" panose="02020603050405020304" pitchFamily="18" charset="0"/>
               </a:rPr>
@@ -11578,7 +11247,7 @@
           </a:p>
           <a:p>
             <a:r>
-              <a:rPr lang="en-US" altLang="zh-CN" sz="1600" dirty="0" smtClean="0">
+              <a:rPr lang="en-US" altLang="zh-CN" sz="1600" dirty="0">
                 <a:latin typeface="Times New Roman" panose="02020603050405020304" pitchFamily="18" charset="0"/>
                 <a:cs typeface="Times New Roman" panose="02020603050405020304" pitchFamily="18" charset="0"/>
               </a:rPr>
@@ -11587,7 +11256,7 @@
           </a:p>
           <a:p>
             <a:r>
-              <a:rPr lang="en-US" altLang="zh-CN" sz="1600" dirty="0" smtClean="0">
+              <a:rPr lang="en-US" altLang="zh-CN" sz="1600" dirty="0">
                 <a:latin typeface="Times New Roman" panose="02020603050405020304" pitchFamily="18" charset="0"/>
                 <a:cs typeface="Times New Roman" panose="02020603050405020304" pitchFamily="18" charset="0"/>
               </a:rPr>
@@ -11596,7 +11265,7 @@
           </a:p>
           <a:p>
             <a:r>
-              <a:rPr lang="en-US" altLang="zh-CN" sz="1600" dirty="0" smtClean="0">
+              <a:rPr lang="en-US" altLang="zh-CN" sz="1600" dirty="0">
                 <a:latin typeface="Times New Roman" panose="02020603050405020304" pitchFamily="18" charset="0"/>
                 <a:cs typeface="Times New Roman" panose="02020603050405020304" pitchFamily="18" charset="0"/>
               </a:rPr>
@@ -11605,7 +11274,7 @@
           </a:p>
           <a:p>
             <a:r>
-              <a:rPr lang="en-US" altLang="zh-CN" sz="1600" dirty="0" smtClean="0">
+              <a:rPr lang="en-US" altLang="zh-CN" sz="1600" dirty="0">
                 <a:latin typeface="Times New Roman" panose="02020603050405020304" pitchFamily="18" charset="0"/>
                 <a:cs typeface="Times New Roman" panose="02020603050405020304" pitchFamily="18" charset="0"/>
               </a:rPr>
@@ -11614,7 +11283,7 @@
           </a:p>
           <a:p>
             <a:r>
-              <a:rPr lang="en-US" altLang="zh-CN" sz="1600" dirty="0" smtClean="0">
+              <a:rPr lang="en-US" altLang="zh-CN" sz="1600" dirty="0">
                 <a:latin typeface="Times New Roman" panose="02020603050405020304" pitchFamily="18" charset="0"/>
                 <a:cs typeface="Times New Roman" panose="02020603050405020304" pitchFamily="18" charset="0"/>
               </a:rPr>
@@ -11623,7 +11292,7 @@
           </a:p>
           <a:p>
             <a:r>
-              <a:rPr lang="en-US" altLang="zh-CN" sz="1600" dirty="0" smtClean="0">
+              <a:rPr lang="en-US" altLang="zh-CN" sz="1600" dirty="0">
                 <a:latin typeface="Times New Roman" panose="02020603050405020304" pitchFamily="18" charset="0"/>
                 <a:cs typeface="Times New Roman" panose="02020603050405020304" pitchFamily="18" charset="0"/>
               </a:rPr>
@@ -11632,20 +11301,20 @@
           </a:p>
           <a:p>
             <a:r>
-              <a:rPr lang="en-US" altLang="zh-CN" sz="1600" dirty="0" smtClean="0">
+              <a:rPr lang="en-US" altLang="zh-CN" sz="1600" dirty="0">
                 <a:latin typeface="Times New Roman" panose="02020603050405020304" pitchFamily="18" charset="0"/>
                 <a:cs typeface="Times New Roman" panose="02020603050405020304" pitchFamily="18" charset="0"/>
               </a:rPr>
               <a:t>  END  </a:t>
             </a:r>
             <a:r>
-              <a:rPr lang="en-US" altLang="zh-CN" sz="1600" dirty="0" err="1" smtClean="0">
+              <a:rPr lang="en-US" altLang="zh-CN" sz="1600" dirty="0" err="1">
                 <a:latin typeface="Times New Roman" panose="02020603050405020304" pitchFamily="18" charset="0"/>
                 <a:cs typeface="Times New Roman" panose="02020603050405020304" pitchFamily="18" charset="0"/>
               </a:rPr>
               <a:t>Merge_Tree_With_Cell</a:t>
             </a:r>
-            <a:endParaRPr lang="zh-CN" altLang="en-US" sz="1600" dirty="0" smtClean="0">
+            <a:endParaRPr lang="zh-CN" altLang="en-US" sz="1600" dirty="0">
               <a:latin typeface="Times New Roman" panose="02020603050405020304" pitchFamily="18" charset="0"/>
               <a:cs typeface="Times New Roman" panose="02020603050405020304" pitchFamily="18" charset="0"/>
             </a:endParaRPr>
@@ -11662,13 +11331,6 @@
   <p:clrMapOvr>
     <a:masterClrMapping/>
   </p:clrMapOvr>
-  <p:timing>
-    <p:tnLst>
-      <p:par>
-        <p:cTn id="1" dur="indefinite" restart="never" nodeType="tmRoot"/>
-      </p:par>
-    </p:tnLst>
-  </p:timing>
 </p:sld>
 </file>
 
@@ -11710,15 +11372,15 @@
           <a:lstStyle/>
           <a:p>
             <a:r>
-              <a:rPr lang="en-US" altLang="zh-CN" dirty="0" smtClean="0"/>
+              <a:rPr lang="en-US" altLang="zh-CN" dirty="0"/>
               <a:t>How to partition a </a:t>
             </a:r>
             <a:r>
-              <a:rPr lang="en-US" altLang="zh-CN" dirty="0" err="1" smtClean="0"/>
+              <a:rPr lang="en-US" altLang="zh-CN" dirty="0" err="1"/>
               <a:t>BspTree</a:t>
             </a:r>
             <a:r>
-              <a:rPr lang="en-US" altLang="zh-CN" dirty="0" smtClean="0"/>
+              <a:rPr lang="en-US" altLang="zh-CN" dirty="0"/>
               <a:t> </a:t>
             </a:r>
             <a:endParaRPr lang="zh-CN" altLang="en-US" dirty="0"/>
@@ -11769,7 +11431,7 @@
               <a:defRPr/>
             </a:pPr>
             <a:r>
-              <a:rPr lang="en-US" altLang="zh-CN" sz="1200" dirty="0" smtClean="0">
+              <a:rPr lang="en-US" altLang="zh-CN" sz="1200" dirty="0">
                 <a:solidFill>
                   <a:srgbClr val="FF0000"/>
                 </a:solidFill>
@@ -11827,7 +11489,7 @@
               <a:defRPr/>
             </a:pPr>
             <a:r>
-              <a:rPr lang="en-US" altLang="zh-CN" sz="1200" dirty="0" smtClean="0">
+              <a:rPr lang="en-US" altLang="zh-CN" sz="1200" dirty="0">
                 <a:solidFill>
                   <a:schemeClr val="tx1"/>
                 </a:solidFill>
@@ -11901,7 +11563,7 @@
                 <a:defRPr/>
               </a:pPr>
               <a:r>
-                <a:rPr lang="en-US" altLang="zh-CN" sz="1200" dirty="0" smtClean="0">
+                <a:rPr lang="en-US" altLang="zh-CN" sz="1200" dirty="0">
                   <a:solidFill>
                     <a:schemeClr val="tx1"/>
                   </a:solidFill>
@@ -12068,7 +11730,7 @@
                 <a:defRPr/>
               </a:pPr>
               <a:r>
-                <a:rPr lang="en-US" altLang="zh-CN" sz="1200" dirty="0" smtClean="0">
+                <a:rPr lang="en-US" altLang="zh-CN" sz="1200" dirty="0">
                   <a:solidFill>
                     <a:schemeClr val="tx1"/>
                   </a:solidFill>
@@ -12188,7 +11850,7 @@
                 <a:defRPr/>
               </a:pPr>
               <a:r>
-                <a:rPr lang="en-US" altLang="zh-CN" sz="1200" dirty="0" smtClean="0">
+                <a:rPr lang="en-US" altLang="zh-CN" sz="1200" dirty="0">
                   <a:solidFill>
                     <a:schemeClr val="tx1"/>
                   </a:solidFill>
@@ -12424,7 +12086,7 @@
               <a:defRPr/>
             </a:pPr>
             <a:r>
-              <a:rPr lang="en-US" altLang="zh-CN" sz="1200" dirty="0" smtClean="0">
+              <a:rPr lang="en-US" altLang="zh-CN" sz="1200" dirty="0">
                 <a:solidFill>
                   <a:schemeClr val="tx1"/>
                 </a:solidFill>
@@ -12482,7 +12144,7 @@
               <a:defRPr/>
             </a:pPr>
             <a:r>
-              <a:rPr lang="en-US" altLang="zh-CN" sz="1200" dirty="0" smtClean="0">
+              <a:rPr lang="en-US" altLang="zh-CN" sz="1200" dirty="0">
                 <a:solidFill>
                   <a:schemeClr val="tx1"/>
                 </a:solidFill>
@@ -12540,7 +12202,7 @@
               <a:defRPr/>
             </a:pPr>
             <a:r>
-              <a:rPr lang="en-US" altLang="zh-CN" sz="1200" dirty="0" smtClean="0">
+              <a:rPr lang="en-US" altLang="zh-CN" sz="1200" dirty="0">
                 <a:solidFill>
                   <a:schemeClr val="tx1"/>
                 </a:solidFill>
@@ -12628,7 +12290,7 @@
                   <a:defRPr/>
                 </a:pPr>
                 <a:r>
-                  <a:rPr lang="en-US" altLang="zh-CN" sz="1200" dirty="0" smtClean="0">
+                  <a:rPr lang="en-US" altLang="zh-CN" sz="1200" dirty="0">
                     <a:solidFill>
                       <a:schemeClr val="tx1"/>
                     </a:solidFill>
@@ -12749,7 +12411,7 @@
                   <a:defRPr/>
                 </a:pPr>
                 <a:r>
-                  <a:rPr lang="en-US" altLang="zh-CN" sz="1200" dirty="0" smtClean="0">
+                  <a:rPr lang="en-US" altLang="zh-CN" sz="1200" dirty="0">
                     <a:solidFill>
                       <a:schemeClr val="tx1"/>
                     </a:solidFill>
@@ -13029,7 +12691,7 @@
                 <a:defRPr/>
               </a:pPr>
               <a:r>
-                <a:rPr lang="en-US" altLang="zh-CN" sz="1200" dirty="0" smtClean="0">
+                <a:rPr lang="en-US" altLang="zh-CN" sz="1200" dirty="0">
                   <a:solidFill>
                     <a:schemeClr val="tx1"/>
                   </a:solidFill>
@@ -13087,7 +12749,7 @@
                 <a:defRPr/>
               </a:pPr>
               <a:r>
-                <a:rPr lang="en-US" altLang="zh-CN" sz="1200" dirty="0" smtClean="0">
+                <a:rPr lang="en-US" altLang="zh-CN" sz="1200" dirty="0">
                   <a:solidFill>
                     <a:schemeClr val="tx1"/>
                   </a:solidFill>
@@ -13145,7 +12807,7 @@
                 <a:defRPr/>
               </a:pPr>
               <a:r>
-                <a:rPr lang="en-US" altLang="zh-CN" sz="1200" dirty="0" smtClean="0">
+                <a:rPr lang="en-US" altLang="zh-CN" sz="1200" dirty="0">
                   <a:solidFill>
                     <a:schemeClr val="tx1"/>
                   </a:solidFill>
@@ -13203,7 +12865,7 @@
                 <a:defRPr/>
               </a:pPr>
               <a:r>
-                <a:rPr lang="en-US" altLang="zh-CN" sz="1200" dirty="0" smtClean="0">
+                <a:rPr lang="en-US" altLang="zh-CN" sz="1200" dirty="0">
                   <a:solidFill>
                     <a:schemeClr val="tx1"/>
                   </a:solidFill>
@@ -13276,7 +12938,7 @@
                 <a:defRPr/>
               </a:pPr>
               <a:r>
-                <a:rPr lang="en-US" altLang="zh-CN" sz="1200" dirty="0" smtClean="0">
+                <a:rPr lang="en-US" altLang="zh-CN" sz="1200" dirty="0">
                   <a:solidFill>
                     <a:schemeClr val="tx1"/>
                   </a:solidFill>
@@ -13334,7 +12996,7 @@
                 <a:defRPr/>
               </a:pPr>
               <a:r>
-                <a:rPr lang="en-US" altLang="zh-CN" sz="1200" dirty="0" smtClean="0">
+                <a:rPr lang="en-US" altLang="zh-CN" sz="1200" dirty="0">
                   <a:solidFill>
                     <a:schemeClr val="tx1"/>
                   </a:solidFill>
@@ -13454,7 +13116,7 @@
                   <a:defRPr/>
                 </a:pPr>
                 <a:r>
-                  <a:rPr lang="en-US" altLang="zh-CN" sz="1200" dirty="0" smtClean="0">
+                  <a:rPr lang="en-US" altLang="zh-CN" sz="1200" dirty="0">
                     <a:solidFill>
                       <a:schemeClr val="tx1"/>
                     </a:solidFill>
@@ -13646,7 +13308,7 @@
                 <a:defRPr/>
               </a:pPr>
               <a:r>
-                <a:rPr lang="en-US" altLang="zh-CN" sz="1200" dirty="0" smtClean="0">
+                <a:rPr lang="en-US" altLang="zh-CN" sz="1200" dirty="0">
                   <a:solidFill>
                     <a:schemeClr val="tx1"/>
                   </a:solidFill>
@@ -13704,7 +13366,7 @@
                 <a:defRPr/>
               </a:pPr>
               <a:r>
-                <a:rPr lang="en-US" altLang="zh-CN" sz="1200" dirty="0" smtClean="0">
+                <a:rPr lang="en-US" altLang="zh-CN" sz="1200" dirty="0">
                   <a:solidFill>
                     <a:schemeClr val="tx1"/>
                   </a:solidFill>
@@ -13745,7 +13407,7 @@
           <a:lstStyle/>
           <a:p>
             <a:r>
-              <a:rPr lang="en-US" altLang="zh-CN" dirty="0" smtClean="0"/>
+              <a:rPr lang="en-US" altLang="zh-CN" dirty="0"/>
               <a:t>Tree B</a:t>
             </a:r>
             <a:endParaRPr lang="zh-CN" altLang="en-US" dirty="0"/>
@@ -13775,7 +13437,7 @@
           <a:lstStyle/>
           <a:p>
             <a:r>
-              <a:rPr lang="en-US" altLang="zh-CN" dirty="0" smtClean="0"/>
+              <a:rPr lang="en-US" altLang="zh-CN" dirty="0"/>
               <a:t>Tree A</a:t>
             </a:r>
             <a:endParaRPr lang="zh-CN" altLang="en-US" dirty="0"/>
@@ -13852,52 +13514,8 @@
           <a:lstStyle/>
           <a:p>
             <a:r>
-              <a:rPr lang="zh-CN" altLang="en-US" dirty="0" smtClean="0"/>
-              <a:t>          </a:t>
-            </a:r>
-            <a:r>
-              <a:rPr lang="zh-CN" altLang="en-US" sz="2800" dirty="0" smtClean="0"/>
-              <a:t>在每次分割节点时需要判断</a:t>
-            </a:r>
-            <a:r>
-              <a:rPr lang="en-US" altLang="zh-CN" sz="2800" dirty="0" smtClean="0"/>
-              <a:t>A</a:t>
-            </a:r>
-            <a:r>
-              <a:rPr lang="zh-CN" altLang="en-US" sz="2800" dirty="0" smtClean="0"/>
-              <a:t>中节点</a:t>
-            </a:r>
-            <a:r>
-              <a:rPr lang="en-US" altLang="zh-CN" sz="2800" dirty="0" smtClean="0"/>
-              <a:t>partition</a:t>
-            </a:r>
-            <a:r>
-              <a:rPr lang="zh-CN" altLang="en-US" sz="2800" dirty="0" smtClean="0"/>
-              <a:t>与</a:t>
-            </a:r>
-            <a:r>
-              <a:rPr lang="en-US" altLang="zh-CN" sz="2800" dirty="0" smtClean="0"/>
-              <a:t>B</a:t>
-            </a:r>
-            <a:r>
-              <a:rPr lang="zh-CN" altLang="en-US" sz="2800" dirty="0" smtClean="0"/>
-              <a:t>中节点</a:t>
-            </a:r>
-            <a:r>
-              <a:rPr lang="en-US" altLang="zh-CN" sz="2800" dirty="0" smtClean="0"/>
-              <a:t>partition</a:t>
-            </a:r>
-            <a:r>
-              <a:rPr lang="zh-CN" altLang="en-US" sz="2800" dirty="0" smtClean="0"/>
-              <a:t>在</a:t>
-            </a:r>
-            <a:r>
-              <a:rPr lang="en-US" altLang="zh-CN" sz="2800" dirty="0" smtClean="0"/>
-              <a:t>B</a:t>
-            </a:r>
-            <a:r>
-              <a:rPr lang="zh-CN" altLang="en-US" sz="2800" dirty="0" smtClean="0"/>
-              <a:t>中节点所表示区域内部的位置关系。</a:t>
+              <a:rPr lang="en-US" altLang="zh-CN" dirty="0"/>
+              <a:t>Each time a node is divided, it is necessary to judge the positional relationship between the node partition in A and the node partition in B within the area represented by the node in B.</a:t>
             </a:r>
             <a:endParaRPr lang="zh-CN" altLang="en-US" sz="2800" dirty="0"/>
           </a:p>
@@ -13972,7 +13590,7 @@
                   <a:defRPr/>
                 </a:pPr>
                 <a:r>
-                  <a:rPr lang="en-US" altLang="zh-CN" sz="1200" dirty="0" smtClean="0">
+                  <a:rPr lang="en-US" altLang="zh-CN" sz="1200" dirty="0">
                     <a:solidFill>
                       <a:schemeClr val="tx1"/>
                     </a:solidFill>
@@ -14046,7 +13664,7 @@
                     <a:defRPr/>
                   </a:pPr>
                   <a:r>
-                    <a:rPr lang="en-US" altLang="zh-CN" sz="1200" dirty="0" smtClean="0">
+                    <a:rPr lang="en-US" altLang="zh-CN" sz="1200" dirty="0">
                       <a:solidFill>
                         <a:schemeClr val="tx1"/>
                       </a:solidFill>
@@ -14282,7 +13900,7 @@
                   <a:defRPr/>
                 </a:pPr>
                 <a:r>
-                  <a:rPr lang="en-US" altLang="zh-CN" sz="1200" dirty="0" smtClean="0">
+                  <a:rPr lang="en-US" altLang="zh-CN" sz="1200" dirty="0">
                     <a:solidFill>
                       <a:schemeClr val="tx1"/>
                     </a:solidFill>
@@ -14340,7 +13958,7 @@
                   <a:defRPr/>
                 </a:pPr>
                 <a:r>
-                  <a:rPr lang="en-US" altLang="zh-CN" sz="1200" dirty="0" smtClean="0">
+                  <a:rPr lang="en-US" altLang="zh-CN" sz="1200" dirty="0">
                     <a:solidFill>
                       <a:schemeClr val="tx1"/>
                     </a:solidFill>
@@ -14398,7 +14016,7 @@
                   <a:defRPr/>
                 </a:pPr>
                 <a:r>
-                  <a:rPr lang="en-US" altLang="zh-CN" sz="1200" dirty="0" smtClean="0">
+                  <a:rPr lang="en-US" altLang="zh-CN" sz="1200" dirty="0">
                     <a:solidFill>
                       <a:schemeClr val="tx1"/>
                     </a:solidFill>
@@ -14439,7 +14057,7 @@
             <a:lstStyle/>
             <a:p>
               <a:r>
-                <a:rPr lang="en-US" altLang="zh-CN" dirty="0" err="1" smtClean="0"/>
+                <a:rPr lang="en-US" altLang="zh-CN" dirty="0" err="1"/>
                 <a:t>B_Left</a:t>
               </a:r>
               <a:endParaRPr lang="zh-CN" altLang="en-US" dirty="0"/>
@@ -14544,7 +14162,7 @@
                       <a:defRPr/>
                     </a:pPr>
                     <a:r>
-                      <a:rPr lang="en-US" altLang="zh-CN" sz="1200" dirty="0" smtClean="0">
+                      <a:rPr lang="en-US" altLang="zh-CN" sz="1200" dirty="0">
                         <a:solidFill>
                           <a:schemeClr val="tx1"/>
                         </a:solidFill>
@@ -14602,7 +14220,7 @@
                       <a:defRPr/>
                     </a:pPr>
                     <a:r>
-                      <a:rPr lang="en-US" altLang="zh-CN" sz="1200" dirty="0" smtClean="0">
+                      <a:rPr lang="en-US" altLang="zh-CN" sz="1200" dirty="0">
                         <a:solidFill>
                           <a:schemeClr val="tx1"/>
                         </a:solidFill>
@@ -14722,7 +14340,7 @@
                         <a:defRPr/>
                       </a:pPr>
                       <a:r>
-                        <a:rPr lang="en-US" altLang="zh-CN" sz="1200" dirty="0" smtClean="0">
+                        <a:rPr lang="en-US" altLang="zh-CN" sz="1200" dirty="0">
                           <a:solidFill>
                             <a:schemeClr val="tx1"/>
                           </a:solidFill>
@@ -14914,7 +14532,7 @@
                       <a:defRPr/>
                     </a:pPr>
                     <a:r>
-                      <a:rPr lang="en-US" altLang="zh-CN" sz="1200" dirty="0" smtClean="0">
+                      <a:rPr lang="en-US" altLang="zh-CN" sz="1200" dirty="0">
                         <a:solidFill>
                           <a:schemeClr val="tx1"/>
                         </a:solidFill>
@@ -14972,7 +14590,7 @@
                       <a:defRPr/>
                     </a:pPr>
                     <a:r>
-                      <a:rPr lang="en-US" altLang="zh-CN" sz="1200" dirty="0" smtClean="0">
+                      <a:rPr lang="en-US" altLang="zh-CN" sz="1200" dirty="0">
                         <a:solidFill>
                           <a:schemeClr val="tx1"/>
                         </a:solidFill>
@@ -15075,7 +14693,7 @@
                     <a:defRPr/>
                   </a:pPr>
                   <a:r>
-                    <a:rPr lang="en-US" altLang="zh-CN" sz="1200" dirty="0" smtClean="0">
+                    <a:rPr lang="en-US" altLang="zh-CN" sz="1200" dirty="0">
                       <a:solidFill>
                         <a:schemeClr val="tx1"/>
                       </a:solidFill>
@@ -15116,7 +14734,7 @@
               <a:lstStyle/>
               <a:p>
                 <a:r>
-                  <a:rPr lang="en-US" altLang="zh-CN" dirty="0" err="1" smtClean="0"/>
+                  <a:rPr lang="en-US" altLang="zh-CN" dirty="0" err="1"/>
                   <a:t>B_Right</a:t>
                 </a:r>
                 <a:endParaRPr lang="zh-CN" altLang="en-US" dirty="0"/>
@@ -15223,7 +14841,7 @@
                   <a:defRPr/>
                 </a:pPr>
                 <a:r>
-                  <a:rPr lang="en-US" altLang="zh-CN" sz="1200" dirty="0" smtClean="0">
+                  <a:rPr lang="en-US" altLang="zh-CN" sz="1200" dirty="0">
                     <a:solidFill>
                       <a:schemeClr val="tx1"/>
                     </a:solidFill>
@@ -15251,7 +14869,7 @@
         <p:spPr>
           <a:xfrm>
             <a:off x="7631678" y="3030489"/>
-            <a:ext cx="1432131" cy="646331"/>
+            <a:ext cx="3641428" cy="646331"/>
           </a:xfrm>
           <a:prstGeom prst="rect">
             <a:avLst/>
@@ -15264,8 +14882,8 @@
           <a:lstStyle/>
           <a:p>
             <a:r>
-              <a:rPr lang="zh-CN" altLang="en-US" dirty="0" smtClean="0"/>
-              <a:t>从上到下分割每个节点</a:t>
+              <a:rPr lang="en-US" altLang="zh-CN" dirty="0"/>
+              <a:t>Split each node from top to bottom</a:t>
             </a:r>
             <a:endParaRPr lang="zh-CN" altLang="en-US" dirty="0"/>
           </a:p>
@@ -15505,15 +15123,15 @@
           <a:lstStyle/>
           <a:p>
             <a:r>
-              <a:rPr lang="en-US" altLang="zh-CN" dirty="0" smtClean="0"/>
+              <a:rPr lang="en-US" altLang="zh-CN" dirty="0"/>
               <a:t>How to partition a </a:t>
             </a:r>
             <a:r>
-              <a:rPr lang="en-US" altLang="zh-CN" dirty="0" err="1" smtClean="0"/>
+              <a:rPr lang="en-US" altLang="zh-CN" dirty="0" err="1"/>
               <a:t>BspTree</a:t>
             </a:r>
             <a:r>
-              <a:rPr lang="en-US" altLang="zh-CN" dirty="0" smtClean="0"/>
+              <a:rPr lang="en-US" altLang="zh-CN" dirty="0"/>
               <a:t> </a:t>
             </a:r>
             <a:endParaRPr lang="zh-CN" altLang="en-US" dirty="0"/>
@@ -15562,197 +15180,102 @@
         <p:spPr>
           <a:xfrm>
             <a:off x="5041595" y="1628800"/>
-            <a:ext cx="4079963" cy="4247317"/>
+            <a:ext cx="31285933" cy="4247317"/>
           </a:xfrm>
           <a:prstGeom prst="rect">
             <a:avLst/>
           </a:prstGeom>
         </p:spPr>
         <p:txBody>
-          <a:bodyPr wrap="none">
+          <a:bodyPr wrap="square">
             <a:spAutoFit/>
           </a:bodyPr>
           <a:lstStyle/>
           <a:p>
             <a:r>
-              <a:rPr lang="en-US" altLang="zh-CN" dirty="0" err="1" smtClean="0"/>
+              <a:rPr lang="en-US" altLang="zh-CN" dirty="0" err="1"/>
               <a:t>T.p</a:t>
             </a:r>
             <a:r>
-              <a:rPr lang="zh-CN" altLang="en-US" dirty="0" smtClean="0"/>
-              <a:t>表示</a:t>
-            </a:r>
-            <a:r>
-              <a:rPr lang="zh-CN" altLang="en-US" dirty="0"/>
-              <a:t>被</a:t>
-            </a:r>
-            <a:r>
-              <a:rPr lang="zh-CN" altLang="en-US" dirty="0" smtClean="0"/>
-              <a:t>分割节点的</a:t>
-            </a:r>
-            <a:r>
-              <a:rPr lang="en-US" altLang="zh-CN" dirty="0" smtClean="0"/>
-              <a:t>partition</a:t>
-            </a:r>
-          </a:p>
-          <a:p>
-            <a:r>
-              <a:rPr lang="zh-CN" altLang="en-US" dirty="0" smtClean="0"/>
-              <a:t>（</a:t>
-            </a:r>
-            <a:r>
-              <a:rPr lang="en-US" altLang="zh-CN" dirty="0" smtClean="0"/>
-              <a:t>B</a:t>
-            </a:r>
-            <a:r>
-              <a:rPr lang="zh-CN" altLang="en-US" dirty="0" smtClean="0"/>
-              <a:t>中节点）</a:t>
-            </a:r>
-            <a:endParaRPr lang="en-US" altLang="zh-CN" dirty="0" smtClean="0"/>
-          </a:p>
-          <a:p>
-            <a:endParaRPr lang="en-US" altLang="zh-CN" dirty="0" smtClean="0"/>
-          </a:p>
-          <a:p>
-            <a:r>
-              <a:rPr lang="en-US" altLang="zh-CN" dirty="0" smtClean="0"/>
-              <a:t>P</a:t>
-            </a:r>
-            <a:r>
-              <a:rPr lang="zh-CN" altLang="en-US" dirty="0" smtClean="0"/>
-              <a:t>表示分割节点的</a:t>
-            </a:r>
-            <a:r>
-              <a:rPr lang="en-US" altLang="zh-CN" dirty="0" smtClean="0"/>
-              <a:t>partition</a:t>
-            </a:r>
-          </a:p>
-          <a:p>
-            <a:r>
-              <a:rPr lang="zh-CN" altLang="en-US" dirty="0" smtClean="0"/>
-              <a:t>（</a:t>
-            </a:r>
-            <a:r>
-              <a:rPr lang="en-US" altLang="zh-CN" dirty="0" smtClean="0"/>
-              <a:t>A</a:t>
-            </a:r>
-            <a:r>
-              <a:rPr lang="zh-CN" altLang="en-US" dirty="0" smtClean="0"/>
-              <a:t>中节点）</a:t>
-            </a:r>
-            <a:endParaRPr lang="en-US" altLang="zh-CN" dirty="0" smtClean="0"/>
+              <a:rPr lang="en-US" altLang="zh-CN" dirty="0"/>
+              <a:t> represents the partition of the split node</a:t>
+            </a:r>
+          </a:p>
+          <a:p>
+            <a:r>
+              <a:rPr lang="en-US" altLang="zh-CN" dirty="0"/>
+              <a:t>(Node in B)</a:t>
+            </a:r>
           </a:p>
           <a:p>
             <a:endParaRPr lang="en-US" altLang="zh-CN" dirty="0"/>
           </a:p>
           <a:p>
-            <a:endParaRPr lang="en-US" altLang="zh-CN" dirty="0" smtClean="0"/>
-          </a:p>
-          <a:p>
-            <a:r>
-              <a:rPr lang="zh-CN" altLang="en-US" dirty="0" smtClean="0"/>
-              <a:t>设被分割的节点为</a:t>
-            </a:r>
-            <a:r>
-              <a:rPr lang="en-US" altLang="zh-CN" dirty="0" smtClean="0"/>
-              <a:t>node1</a:t>
-            </a:r>
-            <a:r>
-              <a:rPr lang="zh-CN" altLang="en-US" dirty="0" smtClean="0"/>
-              <a:t>，</a:t>
-            </a:r>
-            <a:endParaRPr lang="en-US" altLang="zh-CN" dirty="0" smtClean="0"/>
-          </a:p>
-          <a:p>
-            <a:r>
-              <a:rPr lang="zh-CN" altLang="en-US" b="1" dirty="0" smtClean="0"/>
-              <a:t>对</a:t>
-            </a:r>
-            <a:r>
-              <a:rPr lang="en-US" altLang="zh-CN" b="1" dirty="0" smtClean="0"/>
-              <a:t>node1</a:t>
-            </a:r>
-            <a:r>
-              <a:rPr lang="zh-CN" altLang="en-US" b="1" dirty="0" smtClean="0"/>
-              <a:t>的分割过程其实就是对</a:t>
-            </a:r>
-            <a:endParaRPr lang="en-US" altLang="zh-CN" b="1" dirty="0" smtClean="0"/>
-          </a:p>
-          <a:p>
-            <a:r>
-              <a:rPr lang="en-US" altLang="zh-CN" b="1" dirty="0" smtClean="0"/>
-              <a:t>node1</a:t>
-            </a:r>
-            <a:r>
-              <a:rPr lang="zh-CN" altLang="en-US" b="1" dirty="0" smtClean="0"/>
-              <a:t>的左右孩子节点进行分割的过程</a:t>
-            </a:r>
-            <a:endParaRPr lang="en-US" altLang="zh-CN" b="1" dirty="0" smtClean="0"/>
+            <a:r>
+              <a:rPr lang="en-US" altLang="zh-CN" dirty="0"/>
+              <a:t>P represents the partition of the split node</a:t>
+            </a:r>
+          </a:p>
+          <a:p>
+            <a:r>
+              <a:rPr lang="en-US" altLang="zh-CN" dirty="0"/>
+              <a:t>(Node in A)</a:t>
+            </a:r>
           </a:p>
           <a:p>
             <a:endParaRPr lang="en-US" altLang="zh-CN" dirty="0"/>
           </a:p>
           <a:p>
-            <a:r>
-              <a:rPr lang="zh-CN" altLang="en-US" dirty="0" smtClean="0"/>
-              <a:t>所以需要判断</a:t>
-            </a:r>
-            <a:r>
-              <a:rPr lang="en-US" altLang="zh-CN" dirty="0" err="1" smtClean="0"/>
-              <a:t>T</a:t>
+            <a:endParaRPr lang="en-US" altLang="zh-CN" dirty="0"/>
+          </a:p>
+          <a:p>
+            <a:r>
+              <a:rPr lang="en-US" altLang="zh-CN" dirty="0"/>
+              <a:t>Let the split node be node1,</a:t>
+            </a:r>
+          </a:p>
+          <a:p>
+            <a:r>
+              <a:rPr lang="en-US" altLang="zh-CN" dirty="0"/>
+              <a:t>The process of splitting node1 is actually</a:t>
+            </a:r>
+          </a:p>
+          <a:p>
+            <a:r>
+              <a:rPr lang="en-US" altLang="zh-CN" dirty="0"/>
+              <a:t>The process of splitting the left and right child nodes of node1</a:t>
+            </a:r>
+          </a:p>
+          <a:p>
+            <a:endParaRPr lang="en-US" altLang="zh-CN" dirty="0"/>
+          </a:p>
+          <a:p>
+            <a:r>
+              <a:rPr lang="en-US" altLang="zh-CN" dirty="0"/>
+              <a:t>Therefore, it is necessary to judge the positional relationship between </a:t>
             </a:r>
             <a:r>
               <a:rPr lang="en-US" altLang="zh-CN" dirty="0" err="1"/>
-              <a:t>.</a:t>
-            </a:r>
-            <a:r>
-              <a:rPr lang="en-US" altLang="zh-CN" dirty="0" err="1" smtClean="0"/>
-              <a:t>p</a:t>
-            </a:r>
-            <a:r>
-              <a:rPr lang="zh-CN" altLang="en-US" dirty="0" smtClean="0"/>
-              <a:t>和</a:t>
-            </a:r>
-            <a:r>
-              <a:rPr lang="en-US" altLang="zh-CN" dirty="0" smtClean="0"/>
-              <a:t>P</a:t>
-            </a:r>
-            <a:r>
-              <a:rPr lang="zh-CN" altLang="en-US" dirty="0" smtClean="0"/>
-              <a:t>的位置关系，</a:t>
-            </a:r>
-            <a:endParaRPr lang="en-US" altLang="zh-CN" dirty="0" smtClean="0"/>
-          </a:p>
-          <a:p>
-            <a:r>
-              <a:rPr lang="zh-CN" altLang="en-US" dirty="0" smtClean="0"/>
-              <a:t>以决定对</a:t>
-            </a:r>
-            <a:r>
-              <a:rPr lang="en-US" altLang="zh-CN" dirty="0" smtClean="0"/>
-              <a:t>node1</a:t>
-            </a:r>
-            <a:r>
-              <a:rPr lang="zh-CN" altLang="en-US" dirty="0" smtClean="0"/>
-              <a:t>左右孩子的分割策略</a:t>
-            </a:r>
-            <a:endParaRPr lang="en-US" altLang="zh-CN" dirty="0" smtClean="0"/>
+              <a:t>T.p</a:t>
+            </a:r>
+            <a:r>
+              <a:rPr lang="en-US" altLang="zh-CN" dirty="0"/>
+              <a:t> and P.</a:t>
+            </a:r>
+          </a:p>
+          <a:p>
+            <a:r>
+              <a:rPr lang="en-US" altLang="zh-CN" dirty="0"/>
+              <a:t>To determine the segmentation strategy for the left and right children of node1</a:t>
+            </a:r>
           </a:p>
           <a:p>
             <a:endParaRPr lang="en-US" altLang="zh-CN" dirty="0"/>
           </a:p>
           <a:p>
             <a:r>
-              <a:rPr lang="zh-CN" altLang="en-US" dirty="0" smtClean="0"/>
-              <a:t>从</a:t>
-            </a:r>
-            <a:r>
-              <a:rPr lang="en-US" altLang="zh-CN" dirty="0" smtClean="0"/>
-              <a:t>B</a:t>
-            </a:r>
-            <a:r>
-              <a:rPr lang="zh-CN" altLang="en-US" dirty="0" smtClean="0"/>
-              <a:t>根节点到叶子节点逐步递归</a:t>
+              <a:rPr lang="en-US" altLang="zh-CN" dirty="0"/>
+              <a:t>Step by step recursion from B root node to leaf node</a:t>
             </a:r>
             <a:endParaRPr lang="zh-CN" altLang="en-US" dirty="0"/>
           </a:p>
@@ -15768,348 +15291,6 @@
   <p:clrMapOvr>
     <a:masterClrMapping/>
   </p:clrMapOvr>
-  <p:timing>
-    <p:tnLst>
-      <p:par>
-        <p:cTn id="1" dur="indefinite" restart="never" nodeType="tmRoot">
-          <p:childTnLst>
-            <p:seq concurrent="1" nextAc="seek">
-              <p:cTn id="2" dur="indefinite" nodeType="mainSeq">
-                <p:childTnLst>
-                  <p:par>
-                    <p:cTn id="3" fill="hold">
-                      <p:stCondLst>
-                        <p:cond delay="indefinite"/>
-                      </p:stCondLst>
-                      <p:childTnLst>
-                        <p:par>
-                          <p:cTn id="4" fill="hold">
-                            <p:stCondLst>
-                              <p:cond delay="0"/>
-                            </p:stCondLst>
-                            <p:childTnLst>
-                              <p:par>
-                                <p:cTn id="5" presetID="10" presetClass="entr" presetSubtype="0" fill="hold" nodeType="clickEffect">
-                                  <p:stCondLst>
-                                    <p:cond delay="0"/>
-                                  </p:stCondLst>
-                                  <p:childTnLst>
-                                    <p:set>
-                                      <p:cBhvr>
-                                        <p:cTn id="6" dur="1" fill="hold">
-                                          <p:stCondLst>
-                                            <p:cond delay="0"/>
-                                          </p:stCondLst>
-                                        </p:cTn>
-                                        <p:tgtEl>
-                                          <p:spTgt spid="8">
-                                            <p:txEl>
-                                              <p:pRg st="7" end="7"/>
-                                            </p:txEl>
-                                          </p:spTgt>
-                                        </p:tgtEl>
-                                        <p:attrNameLst>
-                                          <p:attrName>style.visibility</p:attrName>
-                                        </p:attrNameLst>
-                                      </p:cBhvr>
-                                      <p:to>
-                                        <p:strVal val="visible"/>
-                                      </p:to>
-                                    </p:set>
-                                    <p:animEffect transition="in" filter="fade">
-                                      <p:cBhvr>
-                                        <p:cTn id="7" dur="500"/>
-                                        <p:tgtEl>
-                                          <p:spTgt spid="8">
-                                            <p:txEl>
-                                              <p:pRg st="7" end="7"/>
-                                            </p:txEl>
-                                          </p:spTgt>
-                                        </p:tgtEl>
-                                      </p:cBhvr>
-                                    </p:animEffect>
-                                  </p:childTnLst>
-                                </p:cTn>
-                              </p:par>
-                              <p:par>
-                                <p:cTn id="8" presetID="10" presetClass="entr" presetSubtype="0" fill="hold" nodeType="withEffect">
-                                  <p:stCondLst>
-                                    <p:cond delay="0"/>
-                                  </p:stCondLst>
-                                  <p:childTnLst>
-                                    <p:set>
-                                      <p:cBhvr>
-                                        <p:cTn id="9" dur="1" fill="hold">
-                                          <p:stCondLst>
-                                            <p:cond delay="0"/>
-                                          </p:stCondLst>
-                                        </p:cTn>
-                                        <p:tgtEl>
-                                          <p:spTgt spid="8">
-                                            <p:txEl>
-                                              <p:pRg st="8" end="8"/>
-                                            </p:txEl>
-                                          </p:spTgt>
-                                        </p:tgtEl>
-                                        <p:attrNameLst>
-                                          <p:attrName>style.visibility</p:attrName>
-                                        </p:attrNameLst>
-                                      </p:cBhvr>
-                                      <p:to>
-                                        <p:strVal val="visible"/>
-                                      </p:to>
-                                    </p:set>
-                                    <p:animEffect transition="in" filter="fade">
-                                      <p:cBhvr>
-                                        <p:cTn id="10" dur="500"/>
-                                        <p:tgtEl>
-                                          <p:spTgt spid="8">
-                                            <p:txEl>
-                                              <p:pRg st="8" end="8"/>
-                                            </p:txEl>
-                                          </p:spTgt>
-                                        </p:tgtEl>
-                                      </p:cBhvr>
-                                    </p:animEffect>
-                                  </p:childTnLst>
-                                </p:cTn>
-                              </p:par>
-                              <p:par>
-                                <p:cTn id="11" presetID="10" presetClass="entr" presetSubtype="0" fill="hold" nodeType="withEffect">
-                                  <p:stCondLst>
-                                    <p:cond delay="0"/>
-                                  </p:stCondLst>
-                                  <p:childTnLst>
-                                    <p:set>
-                                      <p:cBhvr>
-                                        <p:cTn id="12" dur="1" fill="hold">
-                                          <p:stCondLst>
-                                            <p:cond delay="0"/>
-                                          </p:stCondLst>
-                                        </p:cTn>
-                                        <p:tgtEl>
-                                          <p:spTgt spid="8">
-                                            <p:txEl>
-                                              <p:pRg st="9" end="9"/>
-                                            </p:txEl>
-                                          </p:spTgt>
-                                        </p:tgtEl>
-                                        <p:attrNameLst>
-                                          <p:attrName>style.visibility</p:attrName>
-                                        </p:attrNameLst>
-                                      </p:cBhvr>
-                                      <p:to>
-                                        <p:strVal val="visible"/>
-                                      </p:to>
-                                    </p:set>
-                                    <p:animEffect transition="in" filter="fade">
-                                      <p:cBhvr>
-                                        <p:cTn id="13" dur="500"/>
-                                        <p:tgtEl>
-                                          <p:spTgt spid="8">
-                                            <p:txEl>
-                                              <p:pRg st="9" end="9"/>
-                                            </p:txEl>
-                                          </p:spTgt>
-                                        </p:tgtEl>
-                                      </p:cBhvr>
-                                    </p:animEffect>
-                                  </p:childTnLst>
-                                </p:cTn>
-                              </p:par>
-                            </p:childTnLst>
-                          </p:cTn>
-                        </p:par>
-                      </p:childTnLst>
-                    </p:cTn>
-                  </p:par>
-                  <p:par>
-                    <p:cTn id="14" fill="hold">
-                      <p:stCondLst>
-                        <p:cond delay="indefinite"/>
-                      </p:stCondLst>
-                      <p:childTnLst>
-                        <p:par>
-                          <p:cTn id="15" fill="hold">
-                            <p:stCondLst>
-                              <p:cond delay="0"/>
-                            </p:stCondLst>
-                            <p:childTnLst>
-                              <p:par>
-                                <p:cTn id="16" presetID="10" presetClass="entr" presetSubtype="0" fill="hold" nodeType="clickEffect">
-                                  <p:stCondLst>
-                                    <p:cond delay="0"/>
-                                  </p:stCondLst>
-                                  <p:childTnLst>
-                                    <p:set>
-                                      <p:cBhvr>
-                                        <p:cTn id="17" dur="1" fill="hold">
-                                          <p:stCondLst>
-                                            <p:cond delay="0"/>
-                                          </p:stCondLst>
-                                        </p:cTn>
-                                        <p:tgtEl>
-                                          <p:spTgt spid="8">
-                                            <p:txEl>
-                                              <p:pRg st="11" end="11"/>
-                                            </p:txEl>
-                                          </p:spTgt>
-                                        </p:tgtEl>
-                                        <p:attrNameLst>
-                                          <p:attrName>style.visibility</p:attrName>
-                                        </p:attrNameLst>
-                                      </p:cBhvr>
-                                      <p:to>
-                                        <p:strVal val="visible"/>
-                                      </p:to>
-                                    </p:set>
-                                    <p:animEffect transition="in" filter="fade">
-                                      <p:cBhvr>
-                                        <p:cTn id="18" dur="500"/>
-                                        <p:tgtEl>
-                                          <p:spTgt spid="8">
-                                            <p:txEl>
-                                              <p:pRg st="11" end="11"/>
-                                            </p:txEl>
-                                          </p:spTgt>
-                                        </p:tgtEl>
-                                      </p:cBhvr>
-                                    </p:animEffect>
-                                  </p:childTnLst>
-                                </p:cTn>
-                              </p:par>
-                              <p:par>
-                                <p:cTn id="19" presetID="10" presetClass="entr" presetSubtype="0" fill="hold" nodeType="withEffect">
-                                  <p:stCondLst>
-                                    <p:cond delay="0"/>
-                                  </p:stCondLst>
-                                  <p:childTnLst>
-                                    <p:set>
-                                      <p:cBhvr>
-                                        <p:cTn id="20" dur="1" fill="hold">
-                                          <p:stCondLst>
-                                            <p:cond delay="0"/>
-                                          </p:stCondLst>
-                                        </p:cTn>
-                                        <p:tgtEl>
-                                          <p:spTgt spid="8">
-                                            <p:txEl>
-                                              <p:pRg st="12" end="12"/>
-                                            </p:txEl>
-                                          </p:spTgt>
-                                        </p:tgtEl>
-                                        <p:attrNameLst>
-                                          <p:attrName>style.visibility</p:attrName>
-                                        </p:attrNameLst>
-                                      </p:cBhvr>
-                                      <p:to>
-                                        <p:strVal val="visible"/>
-                                      </p:to>
-                                    </p:set>
-                                    <p:animEffect transition="in" filter="fade">
-                                      <p:cBhvr>
-                                        <p:cTn id="21" dur="500"/>
-                                        <p:tgtEl>
-                                          <p:spTgt spid="8">
-                                            <p:txEl>
-                                              <p:pRg st="12" end="12"/>
-                                            </p:txEl>
-                                          </p:spTgt>
-                                        </p:tgtEl>
-                                      </p:cBhvr>
-                                    </p:animEffect>
-                                  </p:childTnLst>
-                                </p:cTn>
-                              </p:par>
-                            </p:childTnLst>
-                          </p:cTn>
-                        </p:par>
-                      </p:childTnLst>
-                    </p:cTn>
-                  </p:par>
-                  <p:par>
-                    <p:cTn id="22" fill="hold">
-                      <p:stCondLst>
-                        <p:cond delay="indefinite"/>
-                      </p:stCondLst>
-                      <p:childTnLst>
-                        <p:par>
-                          <p:cTn id="23" fill="hold">
-                            <p:stCondLst>
-                              <p:cond delay="0"/>
-                            </p:stCondLst>
-                            <p:childTnLst>
-                              <p:par>
-                                <p:cTn id="24" presetID="10" presetClass="entr" presetSubtype="0" fill="hold" nodeType="clickEffect">
-                                  <p:stCondLst>
-                                    <p:cond delay="0"/>
-                                  </p:stCondLst>
-                                  <p:childTnLst>
-                                    <p:set>
-                                      <p:cBhvr>
-                                        <p:cTn id="25" dur="1" fill="hold">
-                                          <p:stCondLst>
-                                            <p:cond delay="0"/>
-                                          </p:stCondLst>
-                                        </p:cTn>
-                                        <p:tgtEl>
-                                          <p:spTgt spid="8">
-                                            <p:txEl>
-                                              <p:pRg st="14" end="14"/>
-                                            </p:txEl>
-                                          </p:spTgt>
-                                        </p:tgtEl>
-                                        <p:attrNameLst>
-                                          <p:attrName>style.visibility</p:attrName>
-                                        </p:attrNameLst>
-                                      </p:cBhvr>
-                                      <p:to>
-                                        <p:strVal val="visible"/>
-                                      </p:to>
-                                    </p:set>
-                                    <p:animEffect transition="in" filter="fade">
-                                      <p:cBhvr>
-                                        <p:cTn id="26" dur="500"/>
-                                        <p:tgtEl>
-                                          <p:spTgt spid="8">
-                                            <p:txEl>
-                                              <p:pRg st="14" end="14"/>
-                                            </p:txEl>
-                                          </p:spTgt>
-                                        </p:tgtEl>
-                                      </p:cBhvr>
-                                    </p:animEffect>
-                                  </p:childTnLst>
-                                </p:cTn>
-                              </p:par>
-                            </p:childTnLst>
-                          </p:cTn>
-                        </p:par>
-                      </p:childTnLst>
-                    </p:cTn>
-                  </p:par>
-                </p:childTnLst>
-              </p:cTn>
-              <p:prevCondLst>
-                <p:cond evt="onPrev" delay="0">
-                  <p:tgtEl>
-                    <p:sldTgt/>
-                  </p:tgtEl>
-                </p:cond>
-              </p:prevCondLst>
-              <p:nextCondLst>
-                <p:cond evt="onNext" delay="0">
-                  <p:tgtEl>
-                    <p:sldTgt/>
-                  </p:tgtEl>
-                </p:cond>
-              </p:nextCondLst>
-            </p:seq>
-          </p:childTnLst>
-        </p:cTn>
-      </p:par>
-    </p:tnLst>
-  </p:timing>
 </p:sld>
 </file>
 
@@ -16151,7 +15332,7 @@
           <a:lstStyle/>
           <a:p>
             <a:r>
-              <a:rPr lang="en-US" altLang="zh-CN" dirty="0" smtClean="0"/>
+              <a:rPr lang="en-US" altLang="zh-CN" dirty="0"/>
               <a:t>Generate polygon edges</a:t>
             </a:r>
             <a:endParaRPr lang="zh-CN" altLang="en-US" dirty="0"/>
@@ -16167,7 +15348,7 @@
         <p:spPr>
           <a:xfrm>
             <a:off x="899592" y="1196752"/>
-            <a:ext cx="7463582" cy="646331"/>
+            <a:ext cx="11678710" cy="646331"/>
           </a:xfrm>
           <a:prstGeom prst="rect">
             <a:avLst/>
@@ -16180,31 +15361,30 @@
           <a:lstStyle/>
           <a:p>
             <a:r>
-              <a:rPr lang="zh-CN" altLang="en-US" dirty="0" smtClean="0"/>
-              <a:t>        之前的过程其实已经完成了</a:t>
-            </a:r>
-            <a:r>
-              <a:rPr lang="en-US" altLang="zh-CN" dirty="0" err="1" smtClean="0"/>
+              <a:rPr lang="en-US" altLang="zh-CN" dirty="0"/>
+              <a:t>The previous process has actually completed the Boolean operation task of </a:t>
+            </a:r>
+            <a:r>
+              <a:rPr lang="en-US" altLang="zh-CN" dirty="0" err="1"/>
               <a:t>BspTree</a:t>
             </a:r>
             <a:r>
-              <a:rPr lang="zh-CN" altLang="en-US" dirty="0" smtClean="0"/>
-              <a:t>的布尔运算任务，但是本次作业</a:t>
-            </a:r>
-            <a:endParaRPr lang="en-US" altLang="zh-CN" dirty="0" smtClean="0"/>
-          </a:p>
-          <a:p>
-            <a:r>
-              <a:rPr lang="zh-CN" altLang="en-US" dirty="0" smtClean="0"/>
-              <a:t>需要显示出多边形的边，所以还需要从</a:t>
-            </a:r>
-            <a:r>
-              <a:rPr lang="en-US" altLang="zh-CN" dirty="0" err="1" smtClean="0"/>
+              <a:rPr lang="en-US" altLang="zh-CN" dirty="0"/>
+              <a:t>, but this assignment</a:t>
+            </a:r>
+          </a:p>
+          <a:p>
+            <a:r>
+              <a:rPr lang="en-US" altLang="zh-CN" dirty="0"/>
+              <a:t>The sides of the polygon need to be displayed, so the sides of the polygon need to be extracted from the </a:t>
+            </a:r>
+            <a:r>
+              <a:rPr lang="en-US" altLang="zh-CN" dirty="0" err="1"/>
               <a:t>BspTree</a:t>
             </a:r>
             <a:r>
-              <a:rPr lang="zh-CN" altLang="en-US" dirty="0" smtClean="0"/>
-              <a:t>中提取多边形的边。</a:t>
+              <a:rPr lang="en-US" altLang="zh-CN" dirty="0"/>
+              <a:t>.</a:t>
             </a:r>
             <a:endParaRPr lang="zh-CN" altLang="en-US" dirty="0"/>
           </a:p>
@@ -16232,7 +15412,7 @@
           <a:lstStyle/>
           <a:p>
             <a:r>
-              <a:rPr lang="en-US" altLang="zh-CN" dirty="0" err="1" smtClean="0">
+              <a:rPr lang="en-US" altLang="zh-CN" dirty="0" err="1">
                 <a:solidFill>
                   <a:schemeClr val="tx1"/>
                 </a:solidFill>
@@ -16242,7 +15422,7 @@
               <a:t>Thibault</a:t>
             </a:r>
             <a:r>
-              <a:rPr lang="en-US" altLang="zh-CN" dirty="0" smtClean="0">
+              <a:rPr lang="en-US" altLang="zh-CN" dirty="0">
                 <a:solidFill>
                   <a:schemeClr val="tx1"/>
                 </a:solidFill>
@@ -16270,7 +15450,7 @@
         <p:spPr>
           <a:xfrm>
             <a:off x="703820" y="3356992"/>
-            <a:ext cx="7200800" cy="1938992"/>
+            <a:ext cx="7200800" cy="2308324"/>
           </a:xfrm>
           <a:prstGeom prst="rect">
             <a:avLst/>
@@ -16283,48 +15463,16 @@
           <a:lstStyle/>
           <a:p>
             <a:r>
-              <a:rPr lang="en-US" altLang="zh-CN" sz="2400" dirty="0" smtClean="0"/>
-              <a:t>        </a:t>
-            </a:r>
-            <a:r>
-              <a:rPr lang="zh-CN" altLang="zh-CN" sz="2400" b="1" dirty="0" smtClean="0"/>
-              <a:t>结果</a:t>
-            </a:r>
-            <a:r>
-              <a:rPr lang="zh-CN" altLang="zh-CN" sz="2400" b="1" dirty="0"/>
-              <a:t>多边形的任意一条边一定是多边形内部和外部的分</a:t>
-            </a:r>
-            <a:r>
-              <a:rPr lang="zh-CN" altLang="zh-CN" sz="2400" b="1" dirty="0" smtClean="0"/>
-              <a:t>割线</a:t>
-            </a:r>
-            <a:r>
-              <a:rPr lang="zh-CN" altLang="en-US" sz="2400" b="1" dirty="0" smtClean="0"/>
-              <a:t>。</a:t>
-            </a:r>
-            <a:endParaRPr lang="en-US" altLang="zh-CN" sz="2400" b="1" dirty="0" smtClean="0"/>
-          </a:p>
-          <a:p>
-            <a:r>
-              <a:rPr lang="en-US" altLang="zh-CN" sz="2400" b="1" dirty="0" smtClean="0"/>
-              <a:t>        </a:t>
-            </a:r>
-            <a:r>
-              <a:rPr lang="zh-CN" altLang="en-US" sz="2400" b="1" dirty="0" smtClean="0"/>
-              <a:t>所以</a:t>
-            </a:r>
-            <a:r>
-              <a:rPr lang="zh-CN" altLang="zh-CN" sz="2400" b="1" dirty="0" smtClean="0"/>
-              <a:t>如果</a:t>
-            </a:r>
-            <a:r>
-              <a:rPr lang="zh-CN" altLang="zh-CN" sz="2400" b="1" dirty="0"/>
-              <a:t>一条边既为一个内部区域的边又为一个外部区域的边，那这条边就属于结果多边形的边界</a:t>
-            </a:r>
-            <a:r>
-              <a:rPr lang="zh-CN" altLang="zh-CN" sz="2400" dirty="0"/>
-              <a:t>。</a:t>
-            </a:r>
+              <a:rPr lang="en-US" altLang="zh-CN" sz="2400" dirty="0"/>
+              <a:t>Any edge of the resulting polygon must be the dividing line between the interior and exterior of the polygon.</a:t>
+            </a:r>
+          </a:p>
+          <a:p>
+            <a:r>
+              <a:rPr lang="en-US" altLang="zh-CN" sz="2400" dirty="0"/>
+              <a:t>         So if an edge is both an edge of an inner region and an edge of an outer region, then this edge belongs to the boundary of the resulting polygon.</a:t>
+            </a:r>
+            <a:endParaRPr lang="zh-CN" altLang="zh-CN" sz="2400" dirty="0"/>
           </a:p>
         </p:txBody>
       </p:sp>
@@ -16462,15 +15610,33 @@
                                   </p:childTnLst>
                                 </p:cTn>
                               </p:par>
+                            </p:childTnLst>
+                          </p:cTn>
+                        </p:par>
+                      </p:childTnLst>
+                    </p:cTn>
+                  </p:par>
+                  <p:par>
+                    <p:cTn id="13" fill="hold">
+                      <p:stCondLst>
+                        <p:cond delay="indefinite"/>
+                      </p:stCondLst>
+                      <p:childTnLst>
+                        <p:par>
+                          <p:cTn id="14" fill="hold">
+                            <p:stCondLst>
+                              <p:cond delay="0"/>
+                            </p:stCondLst>
+                            <p:childTnLst>
                               <p:par>
-                                <p:cTn id="13" presetID="10" presetClass="entr" presetSubtype="0" fill="hold" nodeType="withEffect">
+                                <p:cTn id="15" presetID="10" presetClass="entr" presetSubtype="0" fill="hold" nodeType="clickEffect">
                                   <p:stCondLst>
                                     <p:cond delay="0"/>
                                   </p:stCondLst>
                                   <p:childTnLst>
                                     <p:set>
                                       <p:cBhvr>
-                                        <p:cTn id="14" dur="1" fill="hold">
+                                        <p:cTn id="16" dur="1" fill="hold">
                                           <p:stCondLst>
                                             <p:cond delay="0"/>
                                           </p:stCondLst>
@@ -16492,7 +15658,7 @@
                                     </p:set>
                                     <p:animEffect transition="in" filter="fade">
                                       <p:cBhvr>
-                                        <p:cTn id="15" dur="500"/>
+                                        <p:cTn id="17" dur="500"/>
                                         <p:tgtEl>
                                           <p:spTgt spid="6">
                                             <p:txEl>
@@ -16574,22 +15740,10 @@
           <a:lstStyle/>
           <a:p>
             <a:r>
-              <a:rPr lang="en-US" altLang="zh-CN" dirty="0" smtClean="0">
-                <a:effectLst/>
-              </a:rPr>
-              <a:t>Complexity</a:t>
-            </a:r>
-            <a:r>
               <a:rPr lang="en-US" altLang="zh-CN" dirty="0">
                 <a:effectLst/>
               </a:rPr>
-              <a:t> </a:t>
-            </a:r>
-            <a:r>
-              <a:rPr lang="en-US" altLang="zh-CN" dirty="0" smtClean="0">
-                <a:effectLst/>
-              </a:rPr>
-              <a:t>Analysis</a:t>
+              <a:t>Complexity Analysis</a:t>
             </a:r>
             <a:endParaRPr lang="zh-CN" altLang="en-US" dirty="0"/>
           </a:p>
@@ -16618,13 +15772,13 @@
             <a:endParaRPr lang="en-US" altLang="zh-CN" dirty="0"/>
           </a:p>
           <a:p>
-            <a:endParaRPr lang="en-US" altLang="zh-CN" dirty="0" smtClean="0"/>
-          </a:p>
-          <a:p>
             <a:endParaRPr lang="en-US" altLang="zh-CN" dirty="0"/>
           </a:p>
           <a:p>
-            <a:endParaRPr lang="en-US" altLang="zh-CN" dirty="0" smtClean="0"/>
+            <a:endParaRPr lang="en-US" altLang="zh-CN" dirty="0"/>
+          </a:p>
+          <a:p>
+            <a:endParaRPr lang="en-US" altLang="zh-CN" dirty="0"/>
           </a:p>
           <a:p>
             <a:endParaRPr lang="zh-CN" altLang="en-US" dirty="0"/>
@@ -16820,7 +15974,7 @@
               </a:lstStyle>
               <a:p>
                 <a:r>
-                  <a:rPr lang="en-US" altLang="zh-CN" b="1" dirty="0" smtClean="0">
+                  <a:rPr lang="en-US" altLang="zh-CN" b="1" dirty="0">
                     <a:solidFill>
                       <a:schemeClr val="tx1"/>
                     </a:solidFill>
@@ -16835,7 +15989,7 @@
                   <a:buNone/>
                 </a:pPr>
                 <a:r>
-                  <a:rPr lang="zh-CN" altLang="en-US" dirty="0" smtClean="0">
+                  <a:rPr lang="zh-CN" altLang="en-US" dirty="0">
                     <a:solidFill>
                       <a:schemeClr val="tx1"/>
                     </a:solidFill>
@@ -16845,7 +15999,7 @@
                   <a:t>简单实现</a:t>
                 </a:r>
                 <a:r>
-                  <a:rPr lang="en-US" altLang="zh-CN" dirty="0" smtClean="0">
+                  <a:rPr lang="en-US" altLang="zh-CN" dirty="0">
                     <a:solidFill>
                       <a:schemeClr val="tx1"/>
                     </a:solidFill>
@@ -16896,7 +16050,7 @@
                   </m:oMath>
                 </a14:m>
                 <a:r>
-                  <a:rPr lang="en-US" altLang="zh-CN" dirty="0" smtClean="0">
+                  <a:rPr lang="en-US" altLang="zh-CN" dirty="0">
                     <a:solidFill>
                       <a:schemeClr val="tx1"/>
                     </a:solidFill>
@@ -16911,7 +16065,7 @@
                   <a:buNone/>
                 </a:pPr>
                 <a:r>
-                  <a:rPr lang="zh-CN" altLang="en-US" dirty="0" smtClean="0">
+                  <a:rPr lang="zh-CN" altLang="en-US" dirty="0">
                     <a:solidFill>
                       <a:schemeClr val="tx1"/>
                     </a:solidFill>
@@ -16931,7 +16085,7 @@
                   <a:t>arrangements of </a:t>
                 </a:r>
                 <a:r>
-                  <a:rPr lang="en-US" altLang="zh-CN" dirty="0" err="1" smtClean="0">
+                  <a:rPr lang="en-US" altLang="zh-CN" dirty="0" err="1">
                     <a:solidFill>
                       <a:schemeClr val="tx1"/>
                     </a:solidFill>
@@ -16941,7 +16095,7 @@
                   <a:t>hyperplanes</a:t>
                 </a:r>
                 <a:r>
-                  <a:rPr lang="zh-CN" altLang="en-US" dirty="0" smtClean="0">
+                  <a:rPr lang="zh-CN" altLang="en-US" dirty="0">
                     <a:solidFill>
                       <a:schemeClr val="tx1"/>
                     </a:solidFill>
@@ -17017,7 +16171,7 @@
                   <a:buNone/>
                 </a:pPr>
                 <a:r>
-                  <a:rPr lang="zh-CN" altLang="en-US" dirty="0" smtClean="0">
+                  <a:rPr lang="zh-CN" altLang="en-US" dirty="0">
                     <a:solidFill>
                       <a:schemeClr val="tx1"/>
                     </a:solidFill>
@@ -17027,7 +16181,7 @@
                   <a:t>优化</a:t>
                 </a:r>
                 <a:r>
-                  <a:rPr lang="en-US" altLang="zh-CN" dirty="0" smtClean="0">
+                  <a:rPr lang="en-US" altLang="zh-CN" dirty="0">
                     <a:solidFill>
                       <a:schemeClr val="tx1"/>
                     </a:solidFill>
@@ -17037,7 +16191,7 @@
                   <a:t>merge</a:t>
                 </a:r>
                 <a:r>
-                  <a:rPr lang="zh-CN" altLang="en-US" dirty="0" smtClean="0">
+                  <a:rPr lang="zh-CN" altLang="en-US" dirty="0">
                     <a:solidFill>
                       <a:schemeClr val="tx1"/>
                     </a:solidFill>
@@ -17112,7 +16266,7 @@
                 <a:pPr marL="0" indent="0">
                   <a:buNone/>
                 </a:pPr>
-                <a:endParaRPr lang="en-US" altLang="zh-CN" dirty="0" smtClean="0">
+                <a:endParaRPr lang="en-US" altLang="zh-CN" dirty="0">
                   <a:solidFill>
                     <a:schemeClr val="tx1"/>
                   </a:solidFill>
@@ -17131,7 +16285,7 @@
               </a:p>
               <a:p>
                 <a:r>
-                  <a:rPr lang="en-US" altLang="zh-CN" b="1" dirty="0" smtClean="0">
+                  <a:rPr lang="en-US" altLang="zh-CN" b="1" dirty="0">
                     <a:solidFill>
                       <a:schemeClr val="tx1"/>
                     </a:solidFill>
@@ -17388,13 +16542,6 @@
   <p:clrMapOvr>
     <a:masterClrMapping/>
   </p:clrMapOvr>
-  <p:timing>
-    <p:tnLst>
-      <p:par>
-        <p:cTn id="1" dur="indefinite" restart="never" nodeType="tmRoot"/>
-      </p:par>
-    </p:tnLst>
-  </p:timing>
 </p:sld>
 </file>
 

</xml_diff>